<commit_message>
Final Review Machine Learning intro W4 and W5
</commit_message>
<xml_diff>
--- a/s-405/1. Hypothesis Testing.pptx
+++ b/s-405/1. Hypothesis Testing.pptx
@@ -96,6 +96,63 @@
           <inkml:channelProperty channel="F" name="resolution" value="0" units="1/dev"/>
         </inkml:channelProperties>
       </inkml:inkSource>
+      <inkml:timestamp xml:id="ts0" timeString="2024-10-01T08:50:26.609"/>
+    </inkml:context>
+    <inkml:brush xml:id="br0">
+      <inkml:brushProperty name="width" value="0.05292" units="cm"/>
+      <inkml:brushProperty name="height" value="0.05292" units="cm"/>
+      <inkml:brushProperty name="color" value="#FF0000"/>
+    </inkml:brush>
+    <inkml:brush xml:id="br1">
+      <inkml:brushProperty name="width" value="0.05292" units="cm"/>
+      <inkml:brushProperty name="height" value="0.05292" units="cm"/>
+      <inkml:brushProperty name="color" value="#002060"/>
+    </inkml:brush>
+    <inkml:brush xml:id="br2">
+      <inkml:brushProperty name="width" value="0.05292" units="cm"/>
+      <inkml:brushProperty name="height" value="0.05292" units="cm"/>
+      <inkml:brushProperty name="color" value="#FFFF00"/>
+    </inkml:brush>
+  </inkml:definitions>
+  <inkml:trace contextRef="#ctx0" brushRef="#br0">3769 11997 24575,'1'19'0,"1"4"0,0 5 0,0-8 0,1 1 0,-3 8 0,2 6 0,-2-10 0,0-7 0,0-3 0,0-4 0,0-3 0,0-3 0,-2 4 0,1-3 0,0 2 0,1 3 0,-1-2 0,0 3 0,0-4 0,0-2 0,0-1 0,0-1 0,1 0 0,0 0 0,-1-1 0,2-1 0,-2-1 0,2-17 0,-1-6 0,0-1 0,0-2 0,0 2 0,0 0 0,0-3 0,0 1 0,0 4 0,0 2 0,0-3 0,0 7 0,0 10 0,0 0 0,0 0 0,0 1 0,0-4 0,0 4 0,0-4 0,0-2 0,0 1 0,0-7 0,-1 5 0,-1 0 0,0 5 0,-1 1 0,0 1 0,0 2 0,1-1 0,1 1 0,3 0 0,16-1 0,11-2 0,-3 2 0,4-1 0,6 2 0,-1 1-350,-10-1 0,-1 0 350,2 2 0,-5 0 0,-12 0 0,-1-1 0,-4 1 0,2-2 0,0 2 0,3 0 700,1 0-700,3 0 0,-2 0 0,-2 0 0,-4 0 0,-2 2 0,-1 0 0,-1 5 0,0-2 0,-1 3 0,1-5 0,-2 5 0,1-2 0,-1 3 0,1-2 0,0 1 0,0-3 0,0 3 0,0 0 0,1 5 0,1-6 0,0 3 0,1-7 0,-3 2 0,1 0 0,-1 3 0,0 1 0,0 5 0,0 3 0,0 10 0,0-2 0,0 1 0,0-8 0,0-5 0,0-3 0,0-1 0,0-3 0,0-1 0,0-1 0,0-1 0,0 2 0,0-1 0,0 4 0,0-2 0,0 0 0,0-2 0,0-1 0,0 0 0,1 0 0,0 0 0,0 1 0,-1 0 0,0-1 0,0 1 0,0-1 0,0-1 0,0 1 0,0 0 0,0 1 0,0 0 0,1 2 0,-1-1 0,1 0 0,-1-4 0,0 1 0</inkml:trace>
+  <inkml:trace contextRef="#ctx0" brushRef="#br0" timeOffset="7067">6294 11919 24575,'6'13'0,"-1"3"0,-1 2 0,0 2 0,-2 4 0,1-3 0,-1 8 0,2 5 0,-1-15 0,0 0 0,2 15 0,-2-12 0,-1-11 0,-1-5 0,-1 0 0,3 2 0,-3 0 0,1 3 0,1 2 0,-2 4 0,2-1 0,-2 6 0,3-1 0,0 5 0,2-7 0,-2-4 0,2-29 0,-4-5 0,-1 1 0,0-2 0,-2-4 0,-1-2 0,-1-8 0,-1-2 0,1 8 0,-1-1 0,1-1-194,1-2 0,0-1 0,-1 1 194,-1 5 0,-2 1 0,2 1 0,2-11 0,0 4 0,-2 10 0,0 2 0,3-1 0,-1 0 0,-5-13 0,0 6 0,1 8 0,5 11 582,16 9-582,0-1 0,8 3 0,-4-2 0,-7 0 0,1 0 0,11 0 0,-5 0 0,2 0 0,10 0 0,3 0 0,0 0 0,1 0 0,0 0 0,1 0 0,-4 0 0,0 0 0,1 0 0,-1 0 0,-4 0 0,-1 0 0,-3-1 0,-3 0 0,-1 1 0,-9-1 0,-6 0 0,3 0 0,-4 0 0,-1 1 0,5-2 0,-2 2 0,4-3 0,-4 3 0,0 1 0,-4 11 0,-6 21 0,4-14 0,1 2 0,-3 13 0,0 0 0,2-4 0,2-1 0,-1 1 0,0-2 0,0-6 0,0-1 0,0 8 0,2 1 0,-1-9 0,3-1 0,-2-8 0,1-7 0,-1 2 0,0-4 0,0 1 0,0 0 0,1 2 0,0 4 0,0 0 0,0 3 0,0-4 0,0 2 0,2 4 0,-2-4 0,2 1 0,-4-8 0,1-1 0,0 1 0,-2 0 0,4 2 0,-3 0 0,2 2 0,-1-1 0,1 3 0,4 7 0,-3-4 0,4 1 0,-6-9 0,0-2 0,-1-2 0</inkml:trace>
+  <inkml:trace contextRef="#ctx0" brushRef="#br0" timeOffset="10716">8028 11658 24575,'0'25'0,"0"6"0,0-5 0,0 11 0,0-4 0,0-1 0,0 3 0,0-1 0,0 0 0,0 0 0,0-1 0,0-2 0,0-3 0,0 3 0,0-6 0,0-3 0,0-12 0,2 1 0,0-4 0,0 4 0,-1-2 0,1 3 0,-2-4 0,2 0 0,-1-2 0,2 4 0,0 4 0,2 2 0,0 4 0,-2-6 0,2 3 0,-1-6 0,0-2 0,0 0 0,-5-28 0,1-13 0,-1 2 0,-1-3 0,2 8 0,0-1 0,0 0-996,0-6 0,0 0 0,0 0 996,0 6 0,0 1 0,0 0 0,0-2 0,0-1 0,0 3-163,0 4 0,0 2 163,0-18 0,0 18 0,0 1 0,0 6 0,0 0 2932,0 0-2932,-1-5 382,-2-1-382,0 1 0,0 2 0,0 7 0,0-1 0,1 0 0,0 3 0,1-2 0,1 4 0,0-1 0,-1 1 0,0 0 0,0 1 0,1 0 0,1 0 0,16-1 0,5 2 0,3-1 0,-2 3 0,-5 0 0,-5 0 0,5 0 0,0 0 0,-5 0 0,5-1 0,-6 0 0,-2-2 0,1 3 0,-4-3 0,2 3 0,-2-2 0,0 1 0,-1 0 0,1 1 0,-2 0 0,1 0 0,-1 0 0,-1 0 0,4 0 0,1 0 0,3 0 0,5 0 0,-1 0 0,0 0 0,-5 0 0,-6 0 0,-1 0 0,-1 0 0,-1 0 0,1 0 0,0 0 0,-1 0 0,2 5 0,-2 18 0,-1-4 0,0 1 0,0 8 0,-2 1 0,1 0 0,0 0 0,0 0 0,0-2 0,0 6 0,0-7 0,0-15 0,0 4 0,0-2 0,5 16 0,-2-3 0,2 1 0,-2-4 0,-3-9 0,4 0 0,-1 5 0,5 7 0,-2 3 0,2-3 0,-4-10 0,-1-7 0,-2-6 0,1 1 0,2 5 0,-2 2 0,4 3 0,-3-1 0,2-4 0,-1 3 0,1-3 0,-1 2 0,-2-5 0,-1-2 0,0-2 0,-1 1 0,2 0 0,-2 0 0,1 2 0,-1-1 0,1 6 0,-1-6 0,0 6 0,0-8 0,0 3 0,0 0 0,0 0 0,0-2 0,0-2 0</inkml:trace>
+  <inkml:trace contextRef="#ctx0" brushRef="#br0" timeOffset="12950">5702 11674 24575,'0'20'0,"1"7"0,-2 4 0,-2-3 0,-1 1 0,-1 2-685,1-2 0,1 3 0,-1 0 1,0-1 684,-1-3 0,0 1 0,0-1 0,1-1 0,-1 4 0,0-1 0,1-1 434,2 0 1,1-2-435,4 8 451,1-14-451,3 2 0,-2-7 0,0 2 1419,-1-6-1419,-2-5 0,1 0 0,-2-7 0,0 1 0,-1-2 0</inkml:trace>
+  <inkml:trace contextRef="#ctx0" brushRef="#br0" timeOffset="14201">5664 11656 24575,'14'0'0,"7"0"0,2 3 0,7-2 0,-3 0 0,2 1 0,5-2 0,1 0-316,-7-1 1,1 1-1,0 1 316,0-1 0,1 2 0,-1-1 0,0 0 0,-1 1 0,-2 0 0,0 0 0,-3 0 0,1 0 0,-5 0 233,-13-2-233,-3 0 0,0 0 0,1 0 0,0-1 0,1-1 714,-1 1-714,0-1 0,-1 2 0,0 0 0,-1 0 0,2 5 0,-2 0 0,0 11 0,-2 18 0,0-9 0,0 2 0,0-2 0,0 1 0,0 0 0,1 0 0,-1 0 0,-1 0 0,0 7 0,0-1 0,2-3 0,0-4 0,-3 1 0,4 3 0,-2-19 0,0 7 0,2-8 0,-1 6 0,0-6 0,-1 1 0,0-4 0,0-3 0,2 5 0,-2-1 0,2 2 0,-2 1 0,2-2 0,-2-3 0,0-2 0,0-2 0</inkml:trace>
+  <inkml:trace contextRef="#ctx0" brushRef="#br0" timeOffset="18249">6297 11649 24575,'-6'-3'0,"0"-1"0,0-2 0,-1-3 0,1-2 0,2-1 0,2-6 0,0 5 0,2-14 0,-2 8 0,2-5 0,0 1 0,0 5 0,0-11 0,0 1 0,0-9 0,0 11 0,0 3 0,0 5 0,0-1 0,0-12 0,0 5 0,0-5 0,0 5 0,0 7 0,0-16 0,0 2 0,0 8 0,0 0 0,0-11 0,0 4 0,0 12 0,0-1 0,-2-2 0,1 7 0,0 4 0,2 9 0,9 2 0,2 1 0,14 1 0,-4 0 0,2 1 0,-7-2 0,-8 0 0,0 0 0,-4 0 0,3 0 0,-2 0 0,8 0 0,-5 0 0,3 0 0,-4 0 0,-2 1 0,0 0 0,7 4 0,8-2 0,4 0 0,-4 3 0,1 0-733,9-3 0,1-1 733,-6 2 0,-2 0 0,10-4 0,-12 1 0,-1 1 0,5-1 0,-3 2 0,-9-3 0,-8 0 0,-2 0 1466,0 1-1466,-1 1 0,0 1 0,-2 0 0,0 4 0,-1 1 0,0 6 0,0 6 0,0 2 0,0 2 0,0-7 0,0-3 0,0-3 0,0-2 0,0 2 0,0-2 0,2 3 0,1 6 0,0-5 0,0 5 0,-1 0 0,1-5 0,0 7 0,1-2 0,-1 2 0,5 10 0,0-5 0,1 8 0,-1-9 0,-2 0 0,4 0 0,-8-13 0,5 6 0,-4-12 0,0 2 0,9 9 0,-9-10 0,8 10 0,-6 2 0,1 2 0,2 5 0,-1-6 0,-3-8 0,0-1 0,-1-2 0,-2-3 0,0 0 0,-1-2 0,0 1 0,0-1 0,2 3 0,-2-1 0,2 1 0,-2-2 0,0 1 0,-1-1 0,-1 2 0,0-2 0,2 0 0,-3 0 0,2-1 0,-1-2 0,1 1 0</inkml:trace>
+  <inkml:trace contextRef="#ctx0" brushRef="#br0" timeOffset="22367">3780 11978 9342,'0'-5'0,"0"-9"3276,1 6-1433,-1-6 798,3 3-2641,-3 0 1563,2-1-1563,-1-4 3276,0 3-642,-1-4-2634,1 0 0,-1 3 0,1 3 0,1 5 0,-2 1 0,2 1 0,-1-1 0,1 1 0,-2-2 0,3 2 0,-2 2 0,5-2 0,-1 1 0,3-1 0,-1 1 0,-2 1 0,2 0 0,-2 0 0,1 1 0,-1-2 0,0 3 0,1-2 0,-2 1 0,2 0 0,0 0 0,3 1 0,1-2 0,3 2 0,16 0 0,-10 0 0,4 1 0,0-2 0,-1-1 0,-1 1 0,1 1 0,11-3 0,-7 1 0,4-1 0,-12-1 0,6-1 0,-3 1 0,-5 2 0,-4 0 0,-2 2 0,-2 0 0,0 0 0,0 0 0,-4-1 0,-2 0 0,-7 1 0,-5 1 0,3 0 0,-5 1 0,8-2 0,-7 2 0,6-1 0,-3-1 0,2 1 0,2-1 0,-2 0 0,2 2 0,-7-2 0,4 1 0,-5 0 0,6 0 0,1 0 0,2 0 0,2 2 0,-1 6 0,5 3 0,-2 14 0,5-4 0,-1 8 0,1-9 0,1 2 0,-4-8 0,3 8 0,-5-4 0,4 6 0,-4 6 0,5-4 0,-6-2 0,3-1 0,-3-5 0,2 5 0,4 0 0,2 6 0,2-8 0,-3 4 0,-3-14 0,-4-1 0,-1-7 0,-1 0 0,0 0 0,0-1 0,-2-2 0,1-1 0,-3-3 0,2-1 0,-2-4 0,3-13 0,-4-13 0,6 15 0,1-2 0,-1-4 0,-1-2 0,1 0 0,1-2 0,0 0 0,0 2 0,0-2 0,0 4 0,0 3 0,0 2 0,-1 0 0,0 3 0,-1 2 0,-5-6 0,2 12 0,-3-1 0,1 3 0,1 3 0,2 0 0,0 2 0,1-1 0,-1 1 0,1 0 0,-1 0 0,-1 0 0,0 0 0,0 0 0,0 1 0,-1 0 0,-5 1 0,0 0 0,-9 0 0,7 0 0,-16 0 0,3 0 0,-2 0 0,6 0 0,11 0 0,4 0 0,2 0 0,-2 0 0,0 0 0,-1 0 0,-3 2 0,3-2 0,-4 2 0,6-1 0,-4-1 0,3 3 0,0-3 0,0 1 0,3 1 0,0-2 0,0 1 0,-1 0 0,-2 1 0,0-1 0,2 2 0,1-3 0,0 2 0,1 0 0,-1 1 0,0-1 0,1 1 0,-2 1 0,-7 17 0,-7 11 0,11-3 0,0 2 0,-1-4 0,1 1 0,4 4 0,1-2 0,1-7 0,0-2 0,0 4 0,2-1 0,2 1 0,2 0 0,0 1 0,1 1-560,-1-2 1,0 0 559,2-2 0,-1-1 0,-1 10 0,3-1 0,-3-15 0,-1-1 0,0-7 0,-2-3 0,0 0 0,-1-4 0</inkml:trace>
+  <inkml:trace contextRef="#ctx0" brushRef="#br0" timeOffset="25834">8032 11606 24575,'1'-19'0,"0"0"0,-1-8 0,1-1 0,-1-5 0,0-1-1639,-4-2 1,0 2 1543,2 7 0,-1 2 95,-3 3 0,0 0 542,0 0 1,0 0-543,2-1 0,0 0 284,-1 4 0,0-1-284,2-15 0,-4 5 0,6 2 1814,-5-2-1814,4 8 0,0 8 0,1 6 0,1 3 0,0-3 0,0-1 0,0-3 0,-2 0 0,2 3 0,-3 1 0,2 3 0,-1-1 0,0 0 0,1 0 0,0 1 0,1 3 0,0-1 0,1-1 0,0 1 0,3-1 0,-1 2 0,2 1 0,1 0 0,-2 1 0,2-2 0,-1 2 0,0 0 0,0 0 0,1 0 0,-1 0 0,3 0 0,0 0 0,2 0 0,3 2 0,9 0 0,-3 1 0,2-1 0,16 2 0,0-1 0,-20-2 0,-8-1 0,-3 0 0,-1 0 0,0 0 0,0 0 0,-1 0 0,0 0 0,-2 0 0,3 0 0,0 0 0,3 0 0,-1 0 0,1 0 0,1 0 0,-1 0 0,1 0 0,-2 0 0,-1 0 0,-1 0 0,-2 0 0,1 0 0,-2 0 0,1 0 0,-10 6 0,6 1 0,-8 5 0,6 6 0,2 1 0,-2 6 0,3-4 0,0 0 0,0 14 0,0-13 0,0-1 0,0 6 0,0-7 0,0-4 0,0 1 0,0 7 0,1-5 0,-2 2 0,0 5 0,-1 0 0,2-6 0,-1 0 0,-1 2 0,1-3 0,1 0 0,2 11 0,6 2 0,-2-13 0,0-1 0,10 15 0,-6-12 0,0 0 0,5 4 0,0 6 0,-5-16 0,-6-6 0,1-3 0</inkml:trace>
+  <inkml:trace contextRef="#ctx0" brushRef="#br0" timeOffset="28467">6211 10857 24575,'-2'-8'0,"15"-11"0,-10 1 0,0-2 0,10-5 0,2-3 0,-10 2 0,-1-2 0,1 0 0,3 3 0,1-1 0,-1 1 0,-2-1 0,-3 0 0,1 1 0,2-4 0,-1 2 0,-3 5 0,-1 1 0,1-1 0,-1 1 0,-1-12 0,3-3 0,-3 5 0,0 4-537,0-10 537,0 5 0,0-1 0,0-3 0,0 10 0,0-9 0,0 4 0,0-1 0,0 11 537,1 8-537,11 11 0,5 1 0,14 5 0,-11 0 0,0 2 0,7 0 0,2 1 0,6 0 0,1 0 0,-2 0 0,-2-1 0,-4-3 0,-2-1 0,0 5 0,-16-7 0,-7 2 0,0-2 0,0 1 0,0-1 0,2 2 0,0 0 0,2 1 0,-1-1 0,-1 2 0,-2-2 0,0 2 0,0-3 0,0 2 0,0-2 0,-1 2 0,1-3 0,0 2 0,-1 0 0,1 0 0,-2 13 0,1 18 0,-2-12 0,0 1 0,0 6 0,0 0 0,-1-8 0,0-1 0,-2 17 0,0-18 0,-2 6 0,4-11 0,-2 11 0,3-5 0,0 6 0,0 0 0,0 0 0,0-6 0,0-1 0,0-1 0,0-1 0,0 1 0,0 2 0,0-4 0,0 5 0,0-3 0,0-2 0,0-3 0,0-4 0,0 0 0,0-2 0,1 2 0,1 1 0,2 0 0,1 8 0,2-2 0,2 14 0,2 0 0,-3-5 0,-2-1 0,-2-15 0,-2-2 0,-1 0 0,-1-4 0,-2 0 0</inkml:trace>
+  <inkml:trace contextRef="#ctx0" brushRef="#br0" timeOffset="32250">7012 11708 24575,'18'0'0,"14"0"0,0 0 0,-11 0 0,1 0 0,4 0 0,2 0 0,7 0 0,1 0-1007,-9-2 1,-1-1 0,1 1 1006,10 0 0,-3-1 0,-7-1 0,-4 1 710,2-1-710,-10 4 0,-7-1 0,-4 1 0,1-3 0,0 3 2309,6-3-2309,11 1 0,-2 1 0,3-1 0,-7 2 0,1-4 0,-4 4 0,4-4 0,-6 1 0,-3 2 0,3-3 0,-8 4 0,10-1 0,-3 1 0,18 0 0,-8 0 0,6 0 0,-13 0 0,-5 0 0,-4 0 0,0 0 0,0 0 0,0 0 0,0 0 0,-1 0 0,1 0 0,-1 0 0,-1 0 0,1 0 0,0 0 0,-1 0 0,4 0 0,-3 0 0,2 0 0,-2 0 0,-1 0 0,1 0 0,0 0 0,-1 0 0,1 0 0,0 1 0,-1-1 0,2 2 0,0-1 0,1 0 0,0-1 0,-2 0 0,1 0 0,-2 0 0,1 0 0,0 0 0,-1 0 0,1 0 0,0 0 0,1 0 0,-1 0 0,0-1 0,-1 0 0,-1 0 0</inkml:trace>
+  <inkml:trace contextRef="#ctx0" brushRef="#br0" timeOffset="34250">6798 10910 24575,'12'-1'0,"6"-2"0,0 3 0,1-2 0,0 0 0,17 0 0,-1-3-563,-8 4 0,1 1 563,-8-2 0,0 1 0,8-2 0,0 1 0,1 0 0,-2 0 0,-1-1 0,2-2 0,-1 3 0,2 0 0,0-1 0,0-1 0,3-1 0,1 0 0,-1 1 0,-1 1 0,-5-2 0,-2 1 0,-3 1 0,-2 2 0,4-2 0,-7 2 1126,-8 1-1126,1 0 0,-1 0 0,8 0 0,-5 0 0,3 0 0,-3 0 0,-5 0 0,5 0 0,-2 0 0,3 0 0,-2 0 0,-2 0 0,-3 0 0,-3 0 0,2 0 0,-1 0 0,1 0 0,-1 0 0,0 0 0,3 0 0,-1 0 0,2 1 0,-3-1 0,-1 2 0,-1-1 0,1 0 0,1 0 0,-1-1 0,1 2 0,0-1 0,-1 0 0,-1 1 0,0-1 0</inkml:trace>
+  <inkml:trace contextRef="#ctx0" brushRef="#br0" timeOffset="36867">8464 11636 24575,'20'0'0,"0"0"0,6 0 0,0 0 0,2 0 0,2 0 0,-6 0 0,2 0 0,0 0 0,0 0 0,0 0 0,0 0 0,1 0 0,-1 0 0,-2 0 0,0 0 0,-2 0 0,13 0 0,-23 0 0,0 0 0,0 0 0,5 0 0,-6-1 0,17-3 0,-14 1 0,12-2 0,-9 1 0,0 0 0,4 2 0,1 1 0,-1 1 0,-2 0 0,-8 0 0,5 0 0,6 0 0,10 0 0,-13 0 0,1 0-333,-1 0 0,0 0 333,7 0 0,0 0 0,-16 0 0,-1 0 0,-5 0 0,-1 0 0,0 0 666,-1 0-666,2 1 0,-1 1 0,1 3 0,-1 2 0,-1 3 0,0 7 0,-2-7 0,0 13 0,0-6 0,3 8 0,-3 0 0,3-6 0,-3 4 0,-2-9 0,2 9 0,-5-2 0,3 4 0,1 4 0,4-4 0,0 1 0,3-7 0,-6-2 0,3-6 0,-1 6 0,0 2 0,2 5 0,-3-5 0,3-1 0,-1-6 0,1 0 0,-1 0 0,0-3 0,0-1 0,-2-2 0,1 0 0,0 2 0,1 2 0,-1 0 0,2 0 0,-2-3 0,-1 0 0,2-1 0,-2 0 0,1-2 0,-1 0 0,-1 0 0,0-1 0,0 1 0,3 4 0,-1 5 0,3 7 0,-1-2 0,-1-4 0,-2-6 0,2-4 0,-2 1 0,1-2 0,1 3 0,-1 0 0,3 4 0,-3-3 0,1-1 0,-2-4 0</inkml:trace>
+  <inkml:trace contextRef="#ctx0" brushRef="#br0" timeOffset="39550">11990 11821 24575,'-7'31'0,"1"0"0,0 1 0,1 1 0,2-8 0,-1 1 0,1 0 0,1-1 0,1 1 0,0-1 0,-1 9 0,1-3-750,1-4 1,0-3 749,0 12 487,0-17-487,0 5 248,0-11-248,4 19 0,-2-11 0,3 6 764,0-8-764,-2-8 0,5 5 0,-5-2 0,3-5 0,-5 1 0,0-8 0,1 1 0,1-30 0,-1-2-1250,-1 0 0,0-4 1250,0-3 0,-2 1 0,0 1 0,-2 0 0,1 1 0,0 1-330,-1 6 1,1 2 329,-2-9 0,4 8 0,0 10 0,0-7 0,0 2 2408,0-16-2408,0 2 375,-2 12 1,-1 1-376,2-8 0,-4 4 0,5 17 0,0 4 0,1 0 0,0 0 0,2 0 0,1 0 0,1 2 0,15-1 0,4 3 0,13 3 0,-6 1 0,-1 0 0,-5 2 0,0-5 0,6 5-667,1-5 667,-13 1 0,0-1 0,0 1 0,1 0 0,4 0 0,1 0 0,-4 0 0,-1 0 0,16 2 0,-17-4 0,-11 0 0,3 0 667,11 1-667,-3 1 0,1 0 0,-11 1 0,-6-3 0,-1 1 0,1-1 0,1 1 0,0 3 0,-1 9 0,3 10 0,-5 9 0,5 0-368,-4-10 0,0-1 368,5 7 0,-3 9 0,2-12 0,-3 5 0,4 2 0,-3-6 0,0-6 0,1 1 0,2 12 0,-2-5 0,0 0 0,-2-8 0,1 0 368,-1 7 0,0-1-368,1 1 0,2 2 0,0-6 0,-3-14 0,-2 8 0,1-11 0,-2 1 0,1-3 0,-1-1 0,1 0 0,-1 0 0,2 1 0,-2-2 0,0-1 0</inkml:trace>
+  <inkml:trace contextRef="#ctx0" brushRef="#br1" timeOffset="56602">2202 9317 24575,'37'0'0,"-1"0"0,-1 0 0,2 0 0,0 0 0,-3 0 0,-1 0 0,3 0-656,-7 0 1,1 0-1,2 0 1,0 0 0,-1 0 325,0 0 0,0 0 0,-1 0 0,1 0 0,-2 0-357,4 0 1,-1 0-1,-1 0 1,0 0 686,-1 0 0,-1 0 0,-1 0 0,-2 0 0,11 0 0,-2 0 13,1 0 1,-1 0-14,-2 0 0,-1 0 0,-3 0 0,1 0 0,4 0 0,1 0 0,-5 0 0,0 0 0,-5 0 0,0 0 0,2 0 0,1 0 0,1 0 0,2 0 0,0 0 0,3 0 0,0 0 0,2 0 0,2 0-400,-8 0 1,3 0 0,-1 0 0,2 0-1,-1 0 1,1 0 399,-1 0 0,1 0 0,0 0 0,-1 0 0,1 0 0,1 0 0,1 0 0,0 0 0,1 0 0,-1 0 0,0 0 0,-2 0-411,0 0 1,-1 0 0,-1 0-1,0 0 1,1 0 410,0 0 0,1 0 0,0 0 0,-1 0 0,2 0 0,-1 0 0,1 0 0,0 0 0,1 0 0,1 0-240,-1 0 1,0 0 0,1 0-1,1 0 1,-1 0 0,1 0 239,-6 0 0,0 0 0,0 0 0,0 0 0,1 0 0,-1 0 0,0 0-248,1 0 0,1 0 0,-1 0 0,1 0 1,-1 0-1,-1 0 0,-1 0 248,3 0 0,-1 0 0,0 0 0,-1 0 0,0 0-186,1 0 1,0 0 0,0 0 0,-1 0-1,1 0 186,-1 0 0,-1 0 0,0 0 0,1 0 0,-1 0 0,2 0 0,0 0 0,0 0 0,0 0 0,-1 0 0,5 0 1,0 0 0,-1 0 0,1 0-1,-5 0 0,0 0 0,0 0 0,1 0 0,-1 0 0,-2 0 0,-1 0 0,1 0 0,0 0 0,2 0 0,3 0 0,1 0 0,1 0 0,1 0 0,1 0 0,-1 0 0,-1 0 0,-1 0 0,1 0 0,1 0 0,-1 0 0,1 0 0,1 0 0,-3 0 0,0 0 0,1 0 0,0 0 0,0 0 0,0 0 0,0 0 0,0 0 0,-3 0 0,0 0 0,0 0 0,0 0 0,1 0 0,-1 0 0,0 0 0,-1 0 0,0 0 49,1 0 1,-1 0-1,0 0 1,-1 0-1,1 0 1,-1 0-1,1 0 1,1 0-50,1 0 0,1 0 0,0 0 0,1 0 0,-1 0 0,1 0 0,-1 0 0,1 0 0,-2 0 0,1 0 0,-1 0 0,0 0 0,0 0 0,1 0 0,0 0 0,1 0 0,-4 0 0,1 0 0,0 0 0,1 0 0,-1 0 0,1 0 0,0 0 0,-2 0 0,1 0 0,-2 0 0,2 0 0,0 0 0,-1 0 0,-1 0 0,1 0 0,-1 0 0,0 0 0,1 0 0,4 0 0,1 0 0,0 0 0,0 0 0,-1 0 0,-1 0 0,0 0 0,-2 0 0,-2 0 0,1 0 0,-2 0 0,1 0 0,0 0-36,0 0 0,0 0 1,0 0-1,0 0 1,0 0-1,1 0 36,0 0 0,0 0 0,0 0 0,0 0 0,1 0 0,-1 0-63,-1 0 0,-1 0 0,1 0 1,0 0-1,-1 0 0,0 0 63,5 0 0,0 0 0,-1 0 0,0 0 0,0 0 0,0-1 0,-1 0 0,0 0 0,0 0 0,0-1 0,-1 1 0,-1-2 0,0 1 0,1-1 0,2 1 70,-3 0 1,1 0 0,1 1 0,1-1 0,0 0 0,0 0 0,0 1-71,0-1 0,-1 0 0,1 0 0,-1 1 0,2-1 0,0 1 0,1-1 0,-3 1 0,1 1 0,2-1 0,-1 0 0,1 1 0,1-1 0,-1 1 0,-1 0 0,1-1 32,-3 1 0,1 0 0,0 0 0,-1 0 0,1 0 0,-1 0 0,1 0 0,-1 0 0,0 0-32,1 0 0,-1 0 0,1 0 0,-1 0 0,0 0 0,1 0 0,-1 0 0,0 0 0,-1 0 0,3 0 0,-1 0 0,1 0 0,-1 0 0,0 0 0,-1 0 0,-1 0 0,0 0 18,4 0 1,-2 0 0,0 0 0,-1 0 0,0 0-1,-1 0-18,3 0 0,0 1 0,-1-1 0,0 0 0,-1-1 0,-1 1 0,-1-1 0,0 0 0,0 0 0,-2 0 271,0-1 1,-2-1 0,0 0 0,2 0-272,5 1 0,3-1 0,-2 0 0,-2 0 0,-2 0 0,-2-1 0,0 1 0,0-1 0,1 1 0,-1 1 0,1 1 0,-1 1 0,0 0 0,-1-2 0,-1 0 0,1 1 0,-2 1 0,1 0 0,1 0 0,5 0 0,2 0 0,1 0 278,-8 0 1,0 0 0,1 0 0,2 0-279,-3 0 0,2 0 0,1 0 0,-1 0 0,2 0 0,2 0 0,1 0 0,1 0 0,0 0 0,-1 0 250,0 0 1,0 0 0,-1 0 0,1 0 0,1 0-251,-5 0 0,1 0 0,0 0 0,-1 0 0,1 0 0,-2 0 0,2 0 0,0 0 0,-1 0 0,-1 0 0,-1 0 819,3 0 0,-1 0 0,-1 0 0,-3 0-742,8 0 0,-5 0 1,-2 0-1,-27 0 1</inkml:trace>
+  <inkml:trace contextRef="#ctx0" brushRef="#br1" timeOffset="57599">2721 9393 24575,'1'28'0,"1"0"0,-1 0 0,3-1 0,-1 1 0,1 3 0,-1-1 0,1 3 0,-1 1 0,1 1 0,0-1-656,0-2 1,0 0-1,1 0 1,-1 0 0,1 1-1,0 3 1,-1 0-1,0 2 1,1-1 0,0 0-1,0-2 1,1 1-1,0-1 1,0 1 0,-1 0 108,-1-5 1,-1 0 0,0 1 0,0-1 0,0 1 0,0-1 296,1 5 1,1 0 0,0 0-1,-1-1 1,0 2 249,-2-5 0,0 1 0,0-1 0,0 1 0,-1 0 0,1 0-278,1 3 0,-1 0 1,1 1-1,-1 0 0,0 2 278,-1-8 0,0 1 0,0 1 0,0 1 0,-1 0 0,1 0 0,-1 0 0,1 0 0,0 0 0,0-1 0,-1 1 0,1-1 0,-1 1 0,1 0 0,0 1 0,-1 1 54,1-3 0,-1 1 1,1 0-1,0 2 1,-1-1-1,1 0 1,-1 0-1,1-1 1,-1-1-1,0-1-54,1 5 0,-1-1 0,0 0 0,0-2 0,0 0 0,0-2 0,1-1 523,0 5 0,0-1 0,1-1 1,-1-4-1,0-3-523,0 7 0,-3-15 819,-7-25 0,6 6 0,-7-9 0</inkml:trace>
+  <inkml:trace contextRef="#ctx0" brushRef="#br1" timeOffset="58300">4358 9629 24575,'0'31'0,"0"1"0,0-1 0,0 1 0,0-1 0,0 0 0,-1 4 0,1 0 0,0 0 0,0 2 0,0 0 0,0 1 0,1 2-328,-1-8 0,1 2 0,1 0 1,-1 1-1,1 0 0,0 1 1,-1 0-1,1 0 0,0 1 1,0-1 29,0 1 0,0 0 0,0 0 0,1 1 0,-1 0 0,0 0 0,1 0 0,-1 0 1,0-1-1,1 0 0,-1-1-30,0 0 0,0-1 0,0-1 1,0 0-1,0 0 0,0 0 1,0 0-1,0-1 0,1 0 1,-1 1-38,1 2 1,0 0 0,0 1 0,0-1 0,1 0 0,-1-1 0,0 0 0,-1-2 0,0 0 156,-1 7 0,-1-2 0,0-2 1,0 1-1,0-1 0,0 1 208,1-4 0,1-1 0,0 1 0,-1 0 0,1 0 0,0 0 0,-1 0-290,-1-1 0,1 0 0,-1 1 1,0-1-1,0 0 0,0 0 0,0 0 290,1 4 0,0 0 0,0-1 0,0 0 0,0 0 0,-1 0 240,0 3 0,0-1 0,0 0 1,0-1-1,0 0-240,1-2 0,0 0 0,-1-1 0,1-2 0,0-2 0,0 2 0,0-3 0,0-2 0,1 12 0,0-11 0,0-22 0</inkml:trace>
+  <inkml:trace contextRef="#ctx0" brushRef="#br1" timeOffset="58800">5859 9484 21838,'8'31'0,"1"0"0,0 0 0,0 0 0,0 4 0,1 0 0,0 0 0,-1 1-820,-1 0 1,1 0 0,-1 0 0,0 2 272,-1-10 1,0 1 0,1 1 0,-1 0 0,2 2 0,-1 1 250,1-1 0,0 1 0,1 2 0,0 1 0,0 1 0,1 0 0,-1 1 0,1-1 0,0 0 128,-2-5 0,0 1 0,0-1 0,1 1 0,-1-1 0,1 1 0,0 1 0,-1-1 0,1 2 0,0-1 0,0 1 168,-1-2 0,0-1 0,0 2 0,1 0 0,-1 0 0,1 0 0,-1 1 0,1 0 0,-1 0 0,1-1 0,-1 1 0,1-1 0,-1 0 0,1-1-64,0 3 0,1 1 0,0-1 0,0 0 0,0 0 0,0 0 0,0-1 0,0 0 0,-1 0 0,1 0 0,-1-1 0,-1 0 64,1 1 0,0 1 0,-1-1 0,0 0 0,-1-1 0,1 0 0,-1-1 0,1 0 0,-1-2 0,1 0-185,1 3 1,0-1-1,0 0 1,0-2 0,0-1-1,-1-2 1,-2-1 184,2 5 0,-2-3 0,-1-2 0,0-5 2287,4 11-2287,0-51 0,0-8 0,-6 13 0,6-10 0,-1 0 0</inkml:trace>
+  <inkml:trace contextRef="#ctx0" brushRef="#br1" timeOffset="59252">8339 9553 8191,'7'34'0,"0"1"0,0-1 0,0 0 0,-2-6 0,0 2 0,0 1 0,-1 1 0,1 1 0,1 1 0,-1 1 0,1-3 0,-1 1 0,1 1 0,1 1 0,-1 1 0,1 0 0,-1 1 0,1 0 0,-1 0 0,0 0 0,0-2 0,-1 1 0,1 0 0,-1 1 0,0 0 0,1 0 0,-1 0 0,1 0 0,-1-1 0,0 0 0,1-1 0,-1-1 0,2 5 0,0-1 0,-1 0 0,1-2 0,0 1 0,0-1 0,-1 0 0,1 0 0,-1 0 0,0-1 0,0 1 0,0-1 0,-1 0 0,1 0 0,-1-1 0,1 0 0,0 0 0,0-2 121,1 4 0,1-1 0,0-1 0,0 0 0,0-1 0,-1 0 0,1-1-121,0 0 0,-1 0 0,0 0 0,1-2 0,-1 1 0,1-1 0,0 5 0,1-1 0,0 0 0,0-2 0,-1-3 0,1 2 0,-1-3 0,0-5 2449,2-1-2449,5-34 0,-10 8 0,8-9 0</inkml:trace>
+  <inkml:trace contextRef="#ctx0" brushRef="#br1" timeOffset="59586">10856 9724 8191,'4'34'0,"1"0"0,0 0 0,-1 0 0,1 0 0,0 0 0,-1 0 0,1 0 0,0 0 0,0 1 0,0 0 0,0 1 0,1 0 0,-1 1 0,0 1 0,0-6 0,0 1 0,-1 1 0,1 0 0,0 0 0,0 1 0,0 0 0,0 1 0,0-1 0,-1 0 0,1 0 0,-1 1 0,0 0 0,0 1 0,0-1 0,0 1 0,0 0 0,0-1 0,-1 0 0,1-1 0,0 0 0,-1-2 0,2 6 0,-1-2 0,0-1 0,1 0 0,-1-1 0,0 0 0,0 0 0,0 0 0,-1 0 0,1 0 0,0 1 0,-1-1 0,1 0 0,-1-1 0,0-1 0,0-1 183,-1 2 0,0-2 0,0 0 0,0-1 0,1 0 0,-1 0-183,2 4 0,1 0 0,0 0 0,-1-2 0,-1-1 0,0-2 0,-2 0 0,0-2 0,0-3 0,2 4 0,-1-1 0</inkml:trace>
+  <inkml:trace contextRef="#ctx0" brushRef="#br2" timeOffset="67583">2556 3671 24575,'12'8'0,"0"8"0,1 5 0,4 4 0,1 4-609,-1-5 0,1 2 0,-1 0 609,-1 0 0,0 0 0,0 0 0,0-2 0,0-2 0,-1 2 0,-1 1 0,0 0 0,-1 0 0,4 8 0,-1-1 0,-2-2 0,-1-2 0,-3-6 0,0 0 0,0-3 0,-1-2 227,4 10-227,-2-9 0,0 1 0,1-2 0,0 0 0,-2 0 0,-1-1 0,3 1 0,-1-1 0,1 9 0,-1-5 0,1 2 0,1 7 0,2 1 0,-4-7 0,2 1 0,0 1-249,3 6 0,2 2 0,-2-1 249,-2-3 0,-2 0 0,1-1-671,0-1 0,1 1 0,-2-3 671,2 5 0,-1 0 0,3 4 0,0-2 0,-5-15 0,0 1-365,6 15 0,0-1 365,-5-13 0,0-2-404,-1 6 0,0-1 404,2-1 0,1-1 0,-4-1 0,0 0 0,1 0 0,1 0 0,-2 3 0,0 0 0,-1-4 0,0-2 0,-2 3 0,0-1 912,10 13-912,-2-6 0,1 1 0,1 4 0,2 1 0,0-2 0,1-1 967,-6-4 0,0-2-967,6 4 1701,-12-11-1701,5 8 1351,4 4-1351,0 1 0,2 2 0,-2-6 0,1 0-1138,3 6 1,-1 0 1137,-2-5 0,-2-3 0,-3-5 0,-1 0 0,3 4 0,-1 0 0,2 1 0,4 1 0,-1 7 0,-3-8 0,1 4 0,-4-4 0,0 2 0,1 1-386,4 6 1,1 2-1,-1 0 386,-3-4 0,0 0 0,1 0 0,1 4 0,2 0 0,-2-3 0,2 0 0,-2-4 0,-2-1 0,-1-1 0,5 5 0,-1-2 0,-4 0 0,3 1 0,-1-1 2130,-6-13-2130,11 14 0,-14-17 0,7 9 0,-9-14 0,1 2 1302,3 6-1302,1-1 0,3 8 0,2 2 0,5 1 0,-9-7 0,1-1 0,2 1 0,0 0 0,10 11 0,-6-4 0,-3-9 0,1 1 0,0 1 0,-1-1 0,3 2 0,0 0-474,2 1 0,-2 0 474,2 1-34,-2-2 34,-1-1 0,1 1 0,3 2 0,3 4 0,-10-8 0,3 2 0,2 1 0,-3-2 0,0 0 0,5 4 0,3 3 0,-2-2 0,2 2 0,0-1 0,-6-4 0,1 0 0,-2-2 0,-2-2 0,-1-1 0,7 6 0,-5-2 0,0 1 0,-2-3 0,1 2-478,8 7 1,3 4 477,-2-4 0,1 1 0,-1-1-506,-6-5 0,-1-2 1,1 1 505,6 7 0,1 1 0,-2-2 0,-3-2 0,-1-2 0,1 3 0,-1-1 0,-3-7 0,0 0 14,5 9 1,0 0-15,-5-6 0,0-1 0,4 5 0,-1-1 0,-6-6 0,1 1 439,3 5 1,1 0-440,2 0 0,-1-1 0,-4-3 0,-1-1 1273,2 0 0,-1-3-1273,-4-5 0,12 8 0,3 3 0,-11-10 0,1 1-261,2 2 0,0-1 261,9 10 0,-9-11 0,0 0 0,3 8 0,2-1 0,0 1 0,3 6 0,-7-9 0,4 2 0,-2 0-303,2 2 0,0 0 303,1 0 0,1 1 0,-1-1 0,0 4 0,0-1 0,-1-3 0,-2 1 0,-5-2 0,-2-1 0,6 1 0,-3 3 0,2 1 0,-3-9 0,0 0-197,3 5 1,-1 1 196,-2-7 0,-1 0 0,0 0 0,0 0-362,5 7 362,-3-5 0,0 1 0,10 6 291,-5-4 0,1 1-291,-8-5 0,1 2 0,2 2 0,1 1 0,0 1-560,2 4 1,-1 1 0,2 1 559,-1-3 0,0 0 0,2 1 0,0 0 0,2 2 0,1 0 0,0 0 0,0-1 0,-2-3 0,1-1 0,-1-1 0,-2 0-426,4 1 0,-2 0 1,-2-2 425,6 3 0,-2-2 0,-8-3 0,0-1-265,-2-2 1,0-1 264,2 2 0,0-2 0,10 6 0,-7-5 0,-1 0 0,11 6 0,-5-3 0,1 1 0,-10-5 0,-1-1 0,9 3 0,1 0 0,4 3 0,1 1 0,-4-7 0,2 0 0,0 1 0,-3-1 0,1 2 0,0-1 0,0 0 0,5 1 0,0 0 0,-3 0 0,1 2 0,-2 1 0,10-1 0,-7-2 0,-21-4 752,11-2 0,-2 0-752,-17-4 2234,16 4-2234,5 3 0,-6-2 0,1 1-474,7-1 1,-1-1 473,-5 2 0,0-1 0,5 1 0,2 1 0,4 0 0,2 0 0,-2-1 0,3 1 0,1-1 0,-5 0 0,1-1 0,1 1 0,0 0 0,-1 0 0,1-1 0,0 1 0,1 0 0,-1 0-541,-1 0 0,0 1 0,0 0 0,0 0 0,0 0 541,2 1 0,1 1 0,-1 0 0,1 0 0,-1 0 0,0-1 0,0 1 0,-1 0 0,1 0 0,-1 0 0,-1-1 0,0 0 0,0 0 0,0 0 0,0-1-325,0 0 0,-1 0 1,1-1-1,-1 1 0,0-2 325,5 3 0,-1-2 0,0 0 0,-1 0 0,4 0 0,0-1 0,-2 1-629,-1-1 0,-2 0 0,-1 0 629,0 0 0,-1 0 0,3 0 0,-1 0 0,-4-2 0,-1-1 0,3 3 0,0-1 511,-4-1 1,1 0-512,0 0 0,2 2 0,-1 0 0,4 2 0,2 1 0,0-2 0,3 0 0,-1 0 368,-6-2 1,-2 1 0,3-1-369,-1-1 0,2 0 0,0 0 0,-2-1 0,0 0 0,-1 0 0,-1-1 0,5 1 0,-1 0 0,-2-1 0,0-1 0,-1 0 0,-3 0 0,1 1 0,-1-1 0,10-1 0,-1 0 0,-9-1 0,0 1 0,1-1 0,3-1 0,1-2 0,-3 1 0,3 0 0,-1 0 0,-1 0 0,2 0 0,-1 0 0,1 0 0,-2 0 0,2 0 0,-1 0 0,6 0 0,0 0-265,-6 2 0,2 0 265,-5 1 0,2 1 0,0-1 0,5 1 0,2-1 0,0 1 0,-5 0 0,1 1 0,1 0 0,1 0 0,0-1 0,1 0 0,2 0 0,0 0 0,-1 0-77,-2 0 0,0-1 0,1 0 0,-1 1 0,2-1 77,-4-1 0,2 1 0,-1 0 0,1-1 0,-1 1 0,-1-1 0,2 0 0,-1 0 0,-1-1 0,1 1 0,0-1-280,1 1 1,0 0 0,1-1 0,-1 1 0,0 1 279,-2 0 0,-1 1 0,1 0 0,-2 0 0,0 0 0,3 0 0,-1 1 0,-1-1 0,-1 0-337,4 0 1,-2 1 0,0 0 336,7-1 0,-2 0 0,-9-1 0,0-1 0,8 3 0,1 0 0,-6-1 0,-1 1 0,-1-1 0,1 1 0,2-1 0,1 0 746,3-1 1,1-1-747,1 0 0,-1-1 0,-3-1 0,-3 0 2347,7 0-2347,-17 0 2099,-13-1-2099,-5-1 3061,-1-1-3061,-1 1 0,0 0 0,0 1 0</inkml:trace>
+</inkml:ink>
+</file>
+
+<file path=ppt/ink/ink2.xml><?xml version="1.0" encoding="utf-8"?>
+<inkml:ink xmlns:inkml="http://www.w3.org/2003/InkML">
+  <inkml:definitions>
+    <inkml:context xml:id="ctx0">
+      <inkml:inkSource xml:id="inkSrc0">
+        <inkml:traceFormat>
+          <inkml:channel name="X" type="integer" min="-2.14748E9" max="2.14748E9" units="cm"/>
+          <inkml:channel name="Y" type="integer" min="-2.14748E9" max="2.14748E9" units="cm"/>
+          <inkml:channel name="F" type="integer" max="32767" units="dev"/>
+        </inkml:traceFormat>
+        <inkml:channelProperties>
+          <inkml:channelProperty channel="X" name="resolution" value="1000" units="1/cm"/>
+          <inkml:channelProperty channel="Y" name="resolution" value="1000" units="1/cm"/>
+          <inkml:channelProperty channel="F" name="resolution" value="0" units="1/dev"/>
+        </inkml:channelProperties>
+      </inkml:inkSource>
       <inkml:timestamp xml:id="ts0" timeString="2024-05-22T07:28:26.448"/>
     </inkml:context>
     <inkml:brush xml:id="br0">
@@ -124,7 +181,70 @@
 </inkml:ink>
 </file>
 
-<file path=ppt/ink/ink2.xml><?xml version="1.0" encoding="utf-8"?>
+<file path=ppt/ink/ink3.xml><?xml version="1.0" encoding="utf-8"?>
+<inkml:ink xmlns:inkml="http://www.w3.org/2003/InkML">
+  <inkml:definitions>
+    <inkml:context xml:id="ctx0">
+      <inkml:inkSource xml:id="inkSrc0">
+        <inkml:traceFormat>
+          <inkml:channel name="X" type="integer" min="-2.14748E9" max="2.14748E9" units="cm"/>
+          <inkml:channel name="Y" type="integer" min="-2.14748E9" max="2.14748E9" units="cm"/>
+          <inkml:channel name="F" type="integer" max="32767" units="dev"/>
+        </inkml:traceFormat>
+        <inkml:channelProperties>
+          <inkml:channelProperty channel="X" name="resolution" value="1000" units="1/cm"/>
+          <inkml:channelProperty channel="Y" name="resolution" value="1000" units="1/cm"/>
+          <inkml:channelProperty channel="F" name="resolution" value="0" units="1/dev"/>
+        </inkml:channelProperties>
+      </inkml:inkSource>
+      <inkml:timestamp xml:id="ts0" timeString="2024-10-01T08:52:00.211"/>
+    </inkml:context>
+    <inkml:brush xml:id="br0">
+      <inkml:brushProperty name="width" value="0.05292" units="cm"/>
+      <inkml:brushProperty name="height" value="0.05292" units="cm"/>
+      <inkml:brushProperty name="color" value="#FFFF00"/>
+    </inkml:brush>
+  </inkml:definitions>
+  <inkml:trace contextRef="#ctx0" brushRef="#br0">7941 12337 24575,'0'6'0,"0"0"0,0 2 0,-1 0 0,1 4 0,-2 0 0,0 4 0,0-7 0,1 4 0,-1-4 0,2 0 0,-2-2 0,2-3 0,1-2 0,0 1 0,0 0 0,-1-1 0,1 2 0,-1 0 0,2 3 0,-2 0 0,1 1 0,-1 1 0,3 2 0,-1 4 0,-1-2 0,1-2 0,-2-3 0,0-3 0,0 0 0,0 0 0,0 1 0,1-2 0,1 6 0,1-5 0,-1 1 0,0-3 0,-1 0 0,1-1 0,-2 0 0,2-1 0</inkml:trace>
+  <inkml:trace contextRef="#ctx0" brushRef="#br0" timeOffset="1948">7910 12900 24575,'-1'14'0,"-4"-4"0,-7 25 0,-3-15 0,1 1 0,-1 2 0,0-8 0,1 0 0,-8 10 0,2-5 0,16-13 0,3-3 0,1 0 0,4-3 0,3-2 0,-1-2 0,11-10 0,-2-3 0,6-11 0,-6 5 0,-5-2 0,-5 11 0,-2 1 0,0 3 0,-1-1 0,0 2 0,-1 0 0,0 5 0,0-1 0,0 0 0,-1 1 0,1-1 0,1 5 0,5 12 0,-5-2 0,4 15 0,-4-13 0,-2 11 0,4-11 0,-2 5 0,2-6 0,-1-5 0,0 1 0,0-3 0,0-1 0,-1 0 0,3-3 0,2 0 0,6-1 0,1 0 0,9-5 0,10-4 0,-3-9 0,-2 6 0,-17-4 0,-6-5 0,-4 10 0,2-12 0,-3 17 0,0-1 0,0 2 0,-2 2 0,1 0 0,-2 7 0,3 3 0,1 10 0,3-3 0,2 9 0,1 2 0,1-5 0,-2 0 0,-1-11 0,-1-4 0,-1-1 0,2 1 0,-1-1 0,10 10 0,1-4 0,3 1 0,5 4 0,3 2 0,-3-5 0,1 1 0,-1-1 0,-1 0 0,0-1 0,1 1 0,-3-3 0,-11-5 0,0 0 0,-5-3 0,-1-1 0,-2 0 0,0 0 0</inkml:trace>
+  <inkml:trace contextRef="#ctx0" brushRef="#br0" timeOffset="36348">3454 12164 24575,'-17'0'0,"5"1"0,-7 6 0,0 0 0,-1 3 0,-2 1 0,0-1 0,1-1 0,0 1 0,0 0 0,0 3 0,2-1 0,-1 4 0,-1 1 0,4 1 0,7-10 0,-2 3 0,4-4 0,4-2 0,-2 2 0,3 0 0,0 0 0,1 0 0,-2 1 0,4-2 0,-3 5 0,3-4 0,-5 3 0,4-2 0,-5 1 0,6-4 0,2 2 0,-1-4 0,2 2 0,1-1 0,-1 2 0,1-2 0,-1 2 0,0-3 0,1 4 0,-1-4 0,0 1 0,2 1 0,-2-2 0,3 3 0,10 6 0,-5-3 0,9 5 0,-10-7 0,-2-2 0,-1 0 0,-3-2 0,4 3 0,-1-5 0,5 3 0,-3-1 0,1 0 0,-3-1 0,1-2 0,-1 0 0,4 0 0,9 0 0,-2 0 0,2 0 0,5 0 0,2 0 0,1 0 0,1 0 0,-1 0 0,0 0 0,3 0 0,0 0 0,-4-3 0,-1 0 0,-4 3 0,-2-1 0,5-6 0,-18 6 0,-1-2 0,0-1 0,0 1 0,2-3 0,-3 2 0,3-2 0,-4 2 0,0-3 0,2-7 0,-3-6 0,1-1 0,-3-1 0,-1 10 0,0 4 0,-1 3 0,1 2 0,-12-11 0,-4-4 0,-3 2 0,-1-2-429,3 1 0,0 1 429,-5-1 0,-1 0 0,5 3 0,1 2 0,-3-2 0,0 1 0,-9-4 0,7 2 0,13 10 0,-1-1 858,-4-1-858,-2-1 0,-1 3 0,5 1 0,0 2 0,-5-2 0,4 2 0,-10-3 0,13 5 0,-5-3 0,7 3 0,2 0 0,-1 0 0,3 0 0,2 0 0,1 0 0</inkml:trace>
+  <inkml:trace contextRef="#ctx0" brushRef="#br0" timeOffset="45881">12151 12236 24575,'-22'4'0,"1"1"0,-1 3 0,4 1 0,-1 2 0,-12 4 0,-1 1 0,10-4 0,2 0 0,1-2 0,2 0 0,4-1 0,7-5 0,3-2 0,0 1 0,1 0 0,-1 1 0,-2 3 0,-1 1 0,-2 6 0,2-2 0,1 4 0,4-7 0,-1 1 0,2-5 0,0 0 0,0 6 0,4 2 0,-2-1 0,5 2 0,-3-9 0,3 5 0,-4-6 0,5 7 0,-4-6 0,7 5 0,0-2 0,11 10 0,0-6 0,-6-2 0,0 0 0,10 3 0,-1-2 0,4-3 0,-10-3 0,8-2 0,8 2 0,-10-4 0,12 3 0,-6-4 0,1 0 0,1 0 0,4 0 0,-6 0 0,1 0 0,-2 0 0,-7-3 0,1-2 0,0-5 0,-5 3 0,7-7 0,-10 9 0,7-7 0,-8 8 0,-1-3 0,-5 3 0,11-10 0,-12 8 0,8-7 0,-7 6 0,-2-1 0,1-3 0,-2-2 0,-4 2 0,-2 2 0,-4 1 0,1 2 0,-2-1 0,0-1 0,0 3 0,0-3 0,0 3 0,-5-7 0,2 2 0,-10-8 0,10 9 0,-10-9 0,6 8 0,-14-12 0,6 11 0,-2-4 0,2 11 0,2 0 0,-9 4 0,-9-5 0,0 1 0,4-1 0,2 1 0,17 0 0,-2 4 0,4-4 0,5 4 0,-5-2 0,2 0 0,-6 0 0,-14-3 0,5 1 0,-11-1 0,14 1 0,7 2 0,3 0 0,10 2 0,-2 0 0</inkml:trace>
+  <inkml:trace contextRef="#ctx0" brushRef="#br0" timeOffset="56264">7643 6575 24575,'-31'11'0,"6"-6"0,-5 1 0,0 0 0,-2 4 0,0 1 0,-3 1-656,5-3 1,-3 0-1,-1 1 1,0 0 0,1 1 244,4-1 1,1 2-1,0 0 1,1 0 0,-1-1-169,-3 3 1,0 0 0,0 0-1,1 0 579,2 0 0,0-1 0,1 0 0,3-1 0,-9 8 0,3-1 74,2-1 1,1 0-75,1 0 0,3 0 0,4 2 0,3 2 0,4-4 0,2 2 0,-5 6 0,2 0 0,5-7 0,0 1 0,-9 8 0,-1 1 0,6-4 0,1 1 0,-4 6 0,0 0 0,6-4 0,0 1 0,-4 3 0,0-2 632,4-9 1,1-1-633,-3 6 0,0 1 0,0-1 0,1-1 0,0 2 0,1 1 0,-1 3 0,1 1 0,4-6 0,1-1 0,0 1 0,0 0 1574,2-4 1,0 1-1575,-2 7 0,0 2 0,1-3 0,2 1 0,0 5 0,2 1 488,2-11 1,2 1 0,1-2-489,4 10 0,3 0 0,3-1 0,2 0 0,-5-10 0,0-1 0,2 1-374,3 1 1,1-1 0,1 2 373,2 2 0,1 0 0,2 0-820,-1-2 1,2 0 0,1 0 0,-1-2 543,-3-1 1,0-2 0,0 0 0,0 0 275,1-1 0,0 1 0,0-1 0,0-1-889,5 3 1,0-3 0,0 0 888,-1-4 0,1-1 0,1 1 0,-5-1 0,1 0 0,1 0 0,2-1 0,-1-2 0,2 0 0,1-1 0,1 0 0,0 1-286,2 2 0,1 0 0,0 0 0,0 0 0,1-1 286,0 0 0,0-1 0,1-1 0,-1 0 0,0 0 0,-1-1 0,0 0 0,0-1 0,-1 0 0,-1-2 0,3 0 0,-2-1 0,-1-1 0,0-1 7,-3 0 0,0-1 0,-1-1 0,0 1-7,6-1 0,-1 0 0,0 0 0,-2-1 0,-1 0 0,0-1 0,-1 0 0,0-1 0,0 0 0,6-4 0,2-1 0,-3 0 670,-7 3 1,0 0 0,-1 0-671,6-3 0,1-2 0,-3 2 0,3-2 0,-1 1 0,-8 1 0,1-1 0,1 1 0,-1-1 0,0 1 0,0 0 0,-2 0 0,0 0 0,0 0 0,1 2 0,1 0 0,0-1 697,3-3 0,1-2 0,0-1-697,0 1 0,0-2 0,-1-1 0,2-4 0,0-2 0,-2-2 0,-3-1 0,-3-1 0,-1-1 0,-3-1 0,-2 0 0,-1-2 0,-2 0 0,-2-1 0,-1-1 0,1 0 0,-1-1 0,-2-1 0,-3 1 0,-2 0 0,0-1 0,0-2 0,0 0 0,-2 2 567,-1-5 0,-2 1-567,-2 0 0,-1 1 0,-1 10 0,0 0 0,-3 0 0,-2-1 0,0-1 0,-1-1 0,1 3 0,0-2 0,-1 1 0,-1 2 0,0 1 0,-2-3 0,0 0 0,0-3 0,-1 0 0,-1 1 0,-1 0 0,-1 1 0,-1-1 0,-1 0-343,0 1 0,-2-1 1,0-1-1,-1 1 1,0 0 342,1 1 0,-1 1 0,0 0 0,-1 0 0,-1-1 0,3 4 0,-2 0 0,0 0 0,0 0 0,0 0 0,0 1 0,-3-2 0,0 1 0,0 0 0,0 1 0,-1 0 0,1 1 0,0 0 0,0 1 0,0 1 0,2 0 0,-2 0 0,2 1 0,0 1 0,1 1 0,-2-2 0,1 1 0,1 2 853,0-2 1,1 2-854,5 3 0,1 1 0,-2-2 0,0 0 0,1 4 0,-1 1 0,3-3 0,0 2 393,-5 0 1,0 2-394,0-4 0,0 1 0,0 3 0,-2 0 0,-10-3 0,-1 0 0,5 2 0,-2 0 167,-1 3 1,-3 0 0,1 0-168,5 0 0,1-1 0,-2 2 0,-5 0 0,-2 3 0,2-1 0,5 0 0,2 0 0,0 1 0,0 0 0,-1 1 0,3 0 0,2 1 0,2 0 3190,-13 0-3190,26 0 386,2 0-386,2 0 0,1 0 0,-2 1 1082,1 0-1082,-2 3 0,1 0 0,1 1 0,1-1 0,0-1 0,1 4 0,0 4 0,2-3 0,1 5 0,0-8 0,0 2 0,0 1 0,0-2 0,0 4 0,1-2 0,1 0 0,0 0 0,1 0 0,-2-2 0,2 0 0,-3-4 0,1 0 0</inkml:trace>
+</inkml:ink>
+</file>
+
+<file path=ppt/ink/ink4.xml><?xml version="1.0" encoding="utf-8"?>
+<inkml:ink xmlns:inkml="http://www.w3.org/2003/InkML">
+  <inkml:definitions>
+    <inkml:context xml:id="ctx0">
+      <inkml:inkSource xml:id="inkSrc0">
+        <inkml:traceFormat>
+          <inkml:channel name="X" type="integer" min="-2.14748E9" max="2.14748E9" units="cm"/>
+          <inkml:channel name="Y" type="integer" min="-2.14748E9" max="2.14748E9" units="cm"/>
+          <inkml:channel name="F" type="integer" max="32767" units="dev"/>
+        </inkml:traceFormat>
+        <inkml:channelProperties>
+          <inkml:channelProperty channel="X" name="resolution" value="1000" units="1/cm"/>
+          <inkml:channelProperty channel="Y" name="resolution" value="1000" units="1/cm"/>
+          <inkml:channelProperty channel="F" name="resolution" value="0" units="1/dev"/>
+        </inkml:channelProperties>
+      </inkml:inkSource>
+      <inkml:timestamp xml:id="ts0" timeString="2024-10-01T09:04:44.111"/>
+    </inkml:context>
+    <inkml:brush xml:id="br0">
+      <inkml:brushProperty name="width" value="0.05292" units="cm"/>
+      <inkml:brushProperty name="height" value="0.05292" units="cm"/>
+      <inkml:brushProperty name="color" value="#FF0000"/>
+    </inkml:brush>
+  </inkml:definitions>
+  <inkml:trace contextRef="#ctx0" brushRef="#br0">11547 6093 24575,'37'0'0,"0"0"0,0 0 0,0 0 0,0 0 0,-2 0 0,0 0 0,1 0 0,1 0 0,1 0 0,1 0-365,-6 0 1,1 0 0,1 0 0,0 0 0,1 0 0,1 0 0,-1 0 0,1 0 0,0 0 36,-2 0 0,0 0 0,0 0 1,1 0-1,0 0 0,0 0 1,0 0-1,1 0 0,-1 0 1,1 0 29,-2 0 0,1 0 0,1 0 0,-1 0 0,1 0 0,0 0 0,-1 0 0,1 0 1,-2 0-1,1 0 0,-2 0-67,2 0 1,0 0 0,0 0 0,-1 0 0,-1 0 0,0 0 0,0 0 0,0 0 0,0 0 208,1 0 0,0 0 0,1 0 0,-1 0 1,-1 0-1,0 0 0,-2 0 0,0 0 156,6 0 0,-2 0 0,-1 0 0,0 0 0,3 0-245,-4 0 1,1 0 0,1 0 0,1 0 0,0 0 0,0 0 0,0 0 244,-3 0 0,0 0 0,0 0 0,0 0 0,1 0 0,0 0 0,1 0 0,1 0 1,-3 0 0,0 0 0,2 0 0,0 0 0,0 0 0,0 0 0,1 0 0,-1 0 1,0 0-1,-1 0-1,3 0 0,0 0 0,0 0 0,0 0 0,-1 0 0,1 0 0,-1 0 0,0 0 0,-1 0 0,2 0 0,0 0 0,0 0 0,-1 0 0,0 0 0,0 0 0,-1 0 0,-1 0 97,1 0 1,-1 0 0,-1 0-1,0 0 1,0 0 0,0 0-1,1 0-97,-1 0 0,1 0 0,0 0 0,0 0 0,0 0 0,-1 0 0,-1 0 201,2 1 1,-1 0 0,0-1 0,-1 1 0,1 0-1,-1 0-201,2 0 0,0 1 0,0-1 0,0 1 0,-2 0 0,-2 0 0,1 0 0,-1 0 0,-2 1 0,-1-1 0,1 1 0,-2 1 0,-6-2 611,-6 1 1,-3-3 0,-11 0 0</inkml:trace>
+  <inkml:trace contextRef="#ctx0" brushRef="#br0" timeOffset="3218">12904 6128 24575,'28'-14'0,"0"1"0,-4-1 0,-3-1 0,-7-2 0,-2-2 0,3-5 0,0-3 0,-2-1 0,0-3 0,-1-1-820,-2 4 1,-1-2 0,0 0 0,1 0 456,1-3 0,1 0 1,0-1-1,-1 0 363,-4 2 0,0 0 0,-1 0 0,0-1 0,0 2 0,4-4 0,-1 2 0,1 0 0,-1-2 0,-4 5 0,0-1 0,0 0 0,-1 0 0,0 1 0,2-5 0,0 1 0,0 0 0,-1 0 0,0 4 0,0 0 0,0 0 0,0 0 0,0 1 0,0-2 0,0 0 0,1 1 0,-1 1-683,-1-1 0,1 1 0,0 1 0,-1 0 683,0-3 0,-1 1 0,0 1 0,0 3 0,1-1 0,-1 1 140,-1-3 0,0-1 1,-1-1-141,1 1 0,-1-2 0,0 0 0,0 0 0,0-2 0,0 1 0,0-2 0,0 0-333,1 5 0,0-2 0,0 0 1,0 1-1,0-1 333,-1 0 0,0 0 0,0-1 0,0 2 0,1 0 0,3-5 0,1 1 0,0 0 0,-1 2 0,-4 4 0,-1 0 0,-1 1 0,2 0 422,2-6 1,2 0-1,-4 4-422,-4 0 0,-1 2 0,2 2 0,0 2 0,-3 4 0,2 2 3024,2-4-3024,-2 5 1364,5 8-1364,0-3 2462,2 1-2462,-2 2 586,7-8-586,-3 6 0,6-5 0,1 2 0,9-6 0,0 7 0,2-4 0,-12 13 0,-4 6 0,-4 1 0,0 1 0,1 1 0,1 2 0,-1 2 0,2 3 0,-1-1 0,2 13 0,-4 2 0,0-6 0,-1 3 0,-3 10 0,0 2-464,3-4 0,2 2 0,-2 0 464,-2 3 0,0 0 0,-1 0 0,2-7 0,1 0 0,-1 0 0,0-1 0,-2 1 0,-1-1 0,2-1 0,0 9 0,1-2 0,-1-11 0,-1-1-111,2 0 1,0-1 110,-2 5 0,0 11 0,0-18 0,0 0 0,2 1 0,0 0 0,-1 0 0,1-1 0,2 12 0,-1 5 0,-3-17 0,0 1 0,1 4 0,1 2 0,-1 2 0,1 0 0,1-5 0,0 0 0,0 10 0,0 0 0,-1-7 0,-1 1 0,0-3 0,0 2 0,0-1 0,-1 8 0,0-1 58,0-2 1,0-2-59,0-2 0,0-2 0,0-5 0,0 0-300,0 3 0,0 0 300,0-2 0,0 0 0,0 5 0,0 0 0,0-5 0,0 0-127,0 13 0,0 1 127,0 0 0,0-1 0,0-7 0,0 1 0,0-1 0,0 9 0,0-1 0,0-6 0,0 0 0,3 1 0,0-2 0,0 7 0,2-12 0,-1-1 1201,-2-5-1201,1 13 865,-3-13-865,0 1 284,0-6-284,0 4 0,0-2 0,0 11 0,0-5 0,2 6 0,-1-4 0,3-5 0,0-1 0,-1-5 0,2 5 0,1 0 0,-1-1 0,2 1 0,-4-6 0,1 2 0,-2-6 0,1 3 0,-3-5 0,1 0 0,0 1 0,0 1 0,1-1 0,0 2 0,0 1 0,5 10 0,7 13 0,-1-4 0,2 6 0,-9-21 0,0 3 0,-3-9 0,2 6 0,-2-6 0,1 3 0,2-3 0,-2 1 0,1 0 0,1 4 0,3 2 0,0 1 0,0 0 0,2 1 0,-2 0 0,1-3 0,-4-2 0,-2-7 0,-1 0 0,-1-1 0,1-1 0,0 1 0,0-1 0,-1 0 0,1 1 0,1 1 0,-1-1 0,-1 1 0,0-2 0</inkml:trace>
+  <inkml:trace contextRef="#ctx0" brushRef="#br0" timeOffset="5083">11584 8902 24575,'37'0'0,"-8"0"0,5 0 0,-6 0 0,4 0 0,2 0 0,0 0-656,-3 0 1,2 0-1,0 0 1,0 0 0,2 0 120,-3 0 1,2 0 0,0 0 0,0 0 0,1 0 0,-1 0 100,3 0 0,-1 0 0,1 0 0,1 0 0,-1 0 1,0 0 433,-3 0 0,-1 0 0,1 0 0,0 0 0,0 0 0,0 0 0,-1 0 0,0 0 0,0 0 0,0 0 0,0 0 0,0 0 0,0 0 0,0 0 0,1 0 0,0-1 0,0 1 0,0 0 0,0 0 0,-1 0 0,-2 1-345,8 0 0,-2 1 0,-1 1 0,0-1 0,-2-1 345,2 0 0,-1-1 0,-2 0 0,0 2 0,5 2 0,0 1 0,-4 0-599,-2-2 1,-1-1 598,-4 0 0,2 0 0,-2 0 0,5 2 0,1 0 0,0-1 0,4 0 0,-9-2 0,3 0 0,1 1 0,2-1 0,-2 0 0,2-1 0,1 1 0,0 0 0,2 0-133,-2 0 1,1 1 0,0-1 0,2 1 0,0 0 0,0 0 132,-2 0 0,1 1 0,0 0 0,1 0 0,-1 1 0,1-1 0,-2 1 0,-3-1 0,0 0 0,-1 0 0,1 0 0,-1 1 0,0 0 0,0-1 106,4 2 1,1 0-1,-1 1 1,0-1 0,-1 1-1,0-2-106,0 1 0,-2-1 0,1 0 0,-1-1 0,1 1 0,3 0 0,0 1 0,1-1 0,-2 0 0,-1 0 0,-2-1 0,-2-1 0,0 1 0,1-1-28,-1 0 0,1 0 1,0 1-1,0-2 1,-2 0 27,0 0 0,-1-1 0,0 0 0,1-1 0,1 1 0,0 0 0,0 0 0,1 0-264,-1 0 1,1 0 0,-1 0-1,0 0 264,-1 0 0,-1 0 0,1 0 0,-1 0 503,7 0 0,1 0 0,0 0-503,-4 0 0,0 0 0,1 0 0,0 0 0,-1 0 0,0 0 0,1 0 0,0 0 0,-3 1 0,0-1 0,1 0 0,0 0 0,-2-1 0,4 0 0,-1-1 0,-1 0 0,0 0 0,-1-1 0,0 0 0,-1 0 0,-1-2 418,3-1 0,-2-1 1,0-1-419,-2 2 0,-1-1 0,0 0 0,9-3 0,-3 0 0,-3 3 0,-2 1 0,-5-1 0,-1 2 0,8-2 3276,-12 5-2719,-10 0 2719,-2 2-2298,-2-1-523,-1 1 0,0 0 0,-2 0 0</inkml:trace>
+  <inkml:trace contextRef="#ctx0" brushRef="#br0" timeOffset="10017">11834 8837 24575,'17'-7'0,"2"-1"0,3-2 0,1 0 0,1-1 0,0 0-1639,8-5 1,0 0 1258,-5 4 1,1 1-1,-4 0 380,-3 1 0,-2 0 253,7-3 0,-2 1-253,4-1 450,-7 1 1,1-2-451,-3 1 0,-1-2 0,3-1 0,1-3 0,-3 1 0,0-2 0,0 0 0,2-4 0,0-1 0,-4 2 0,0-1 0,-1 1 0,3-3 0,0 1 0,-1-2 0,1 0 0,1 5 0,0 2-381,-5-1 0,-1 1 381,0 3 0,-1 0 0,-1 0 0,-2 0 2157,-2-2-2157,12-5 360,-9 7 1,-1-1-361,1-1 0,1 0 0,2-6 0,-1 0 0,0-3 0,-1 1 0,0 1 0,0 0 0,1-6 0,1 1 0,-3 5 0,1 0 0,5-6 0,2 1 0,-1 10 0,1 0 0,-2-8 0,-1 1 893,8 2-893,-13-2 0,0 11 0,0-3 0,3-2 0,1-7 0,-7 12 0,6-9 0,0 0 0,-6 9 0,4-3 0,1-2 0,7-8 0,-8 10 0,1 0 0,6-10 0,-3 7 0,-4 5 0,1 3 0,-2-4 0,-1 6 0,4-6 0,2-1 0,-5 7 0,6-9 0,-4 5 0,6-7 0,2 0 0,-5 8 0,-4 4 0,-7 7 0,-2 2 0,2-3 0,5 0 0,2-1 0,2-2 0,-2 3 0,-2 0 0,11-1 0,-6 3 0,17-2 0,-14 4 0,3 0 0,-11 2 0,1 0 0,-3 0 0,4 0 0,17 0 0,-11 2 0,2-1 0,1 1 0,7 4 0,-3-3 0,0 0 0,-2 0 0,0 1 0,7 2 0,0 5 0,-1 0 0,-6-1 0,-7-2 0,-7-4 0,-3-2 0,1 2 0,7 3 0,-9-3 0,11 8 0,-9-5 0,4 6 0,0-5 0,-2 1 0,-1-3 0,7 9 0,-6-7 0,7 11 0,-9-11 0,0 2 0,-3-3 0,0-2 0,-1 3 0,1-2 0,5 11 0,-1-2 0,4 6 0,0 5 0,5 4 0,-3-4 0,-2-7 0,-1-1 0,-3-4 0,1 8 0,-5-10 0,-2 0 0,3 2 0,2 4 0,-1 1 0,6 6 0,-2 0 0,-2-8 0,2 2 0,-4 0 0,1 0 0,3 6 0,-1 0 0,-1-3 0,-1 1 0,0 2 0,0-2 0,5 7 0,-6-9 0,0-1 0,3 2 0,-1-2 0,-1 1 0,2 12 0,-1-14 0,-1 0 0,3 12 0,3-6 0,-6-6 0,2-1 0,-7-9 0,5 4 0,-2-1 0,4 8 0,3 1 0,-1-1 0,1 0 0,0-2 0,-4-2 0,1-2 0,2 8 0,-4-10 0,6 11 0,-5-11 0,-2 0 0,2 0 0,-2-1 0,0-2 0,4 10 0,1 0 0,3 10 0,0-5 0,-1 2 0,-4-12 0,1 1 0,-7-8 0,0-2 0,0 2 0,0 0 0,3 0 0,-3 2 0,1-5 0,-1 4 0,7 3 0,-5-3 0,5 2 0,-6-6 0,12 17 0,-6-7 0,10 13 0,-10-12 0,-1-3 0,6 2 0,2 2 0,1-1 0,-4-1 0,-6-6 0,3 3 0,-4-4 0,10 10 0,-10-10 0,10 8 0,-2-4 0,5 4 0,1-2 0,-1 0 0,-5-2 0,4 9 0,0-4 0,-4-4 0,0-1 0,5 3 0,-2-4 0,-9-3 0,-5-4 0,7 2 0,-4-1 0,6 2 0,-1 1 0,19 3 0,-13-4 0,2-1 0,11 3 0,2-1 0,-3 0 0,-1 0 0,-6-2 0,-1 0 0,4 1 0,-13-2 0,14 0 0,-9-2 0,17 4 0,-10-5 0,-4 2 0,2 0 0,5-2 0,2 2 0,-3 2 0,1 2 0,-1 0 0,8-2 0,-2 0 0,-7 1 0,-1 2 0,-2-3 0,12-1 0,-8-1 0,-19-3 0,-5 0 0</inkml:trace>
+</inkml:ink>
+</file>
+
+<file path=ppt/ink/ink5.xml><?xml version="1.0" encoding="utf-8"?>
 <inkml:ink xmlns:inkml="http://www.w3.org/2003/InkML">
   <inkml:definitions>
     <inkml:context xml:id="ctx0">
@@ -201,6 +321,113 @@
 </inkml:ink>
 </file>
 
+<file path=ppt/ink/ink6.xml><?xml version="1.0" encoding="utf-8"?>
+<inkml:ink xmlns:inkml="http://www.w3.org/2003/InkML">
+  <inkml:definitions>
+    <inkml:context xml:id="ctx0">
+      <inkml:inkSource xml:id="inkSrc0">
+        <inkml:traceFormat>
+          <inkml:channel name="X" type="integer" min="-2.14748E9" max="2.14748E9" units="cm"/>
+          <inkml:channel name="Y" type="integer" min="-2.14748E9" max="2.14748E9" units="cm"/>
+          <inkml:channel name="F" type="integer" max="32767" units="dev"/>
+        </inkml:traceFormat>
+        <inkml:channelProperties>
+          <inkml:channelProperty channel="X" name="resolution" value="1000" units="1/cm"/>
+          <inkml:channelProperty channel="Y" name="resolution" value="1000" units="1/cm"/>
+          <inkml:channelProperty channel="F" name="resolution" value="0" units="1/dev"/>
+        </inkml:channelProperties>
+      </inkml:inkSource>
+      <inkml:timestamp xml:id="ts0" timeString="2024-10-01T08:54:01.509"/>
+    </inkml:context>
+    <inkml:brush xml:id="br0">
+      <inkml:brushProperty name="width" value="0.05292" units="cm"/>
+      <inkml:brushProperty name="height" value="0.05292" units="cm"/>
+    </inkml:brush>
+    <inkml:brush xml:id="br1">
+      <inkml:brushProperty name="width" value="0.05292" units="cm"/>
+      <inkml:brushProperty name="height" value="0.05292" units="cm"/>
+      <inkml:brushProperty name="color" value="#002060"/>
+    </inkml:brush>
+  </inkml:definitions>
+  <inkml:trace contextRef="#ctx0" brushRef="#br0">7338 12783 24575,'-6'6'0,"-26"7"0,20-5 0,-22 5 0,28-4 0,-10 2 0,-3 5 0,-5 1 0,-2 6 0,8-7 0,5-1 0,4 0 0,6-8 0,-2 6 0,5-8 0,-3 3 0,3-3 0,-3 1 0,3-1 0,-2 1 0,-4 0 0,3-2 0,-2 6 0,2 3 0,2 11 0,-3 7 0,4 6 0,3-15 0,0-1 0,0 6 0,4-1 0,-3-14 0,-1-3 0,0 3 0,0-3 0,-1-2 0,1 2 0,0-4 0,1 2 0,-1-2 0,-1-1 0,2 2 0,-1 0 0,1 2 0,2 0 0,0-1 0,2 2 0,1-3 0,4 4 0,7-3 0,7 2 0,6 2 0,-14-7 0,0 0-206,0 3 0,0 1 206,3-4 0,1 0 0,-4 4 0,1-1 0,7 0 0,2 0 0,0 3 0,0 0 0,-3-4 0,1-1 0,4 2 0,-1-1 0,-11-4 0,0 0 0,6 1 0,-1 0 0,3 2 412,7 1-412,-22-3 0,7 1 0,-7-2 0,2-1 0,0 1 0,4-2 0,-5 0 0,11 0 0,-3 0 0,10 0 0,6-1 0,-8-3 0,0 1 0,-14-3 0,-4 2 0,-3 0 0,0-1 0,1 1 0,11-6 0,-8 1 0,8-1 0,-10 1 0,-1 4 0,-2 1 0,-3 0 0,-2 2 0,1 0 0,3-6 0,2 0 0,5-6 0,-1 3 0,0-2 0,-5 5 0,-2-1 0,-1 4 0,-3 1 0,3-1 0,-2 1 0,0-2 0,1-2 0,-1-1 0,2-3 0,-2 0 0,2 0 0,-1-2 0,0 2 0,-1-3 0,-1 5 0,-1-1 0,0 4 0,0 0 0,0-7 0,0 4 0,0-4 0,0 0 0,0 9 0,0-6 0,0 7 0,0-1 0,-2-4 0,2-1 0,-3-2 0,-1-3 0,1 4 0,-1-5 0,-1 3 0,2-2 0,-2 4 0,2 1 0,0 4 0,0 0 0,-1-2 0,2 2 0,-4-5 0,4 5 0,-3-1 0,4 3 0,-4-3 0,3 2 0,-7-8 0,4 5 0,-7-13 0,4 9 0,-2-4 0,1 4 0,3 6 0,0-4 0,-1 4 0,3 1 0,-2 0 0,1 2 0,1 0 0,-1 1 0,-1-1 0,1 0 0,-1-1 0,1 1 0,-2-2 0,0 2 0,-2-1 0,2 2 0,-4 1 0,-3-1 0,-11-1 0,-12-2 0,10 1 0,-2 2 0,17 2 0,-6 0 0,8 0 0,-7 0 0,8 0 0,-5 0 0,-1 0 0,-6-2 0,3 1 0,-5-2 0,8 1 0,-8-1 0,-2 2 0,-1 1 0,-5 0 0,-5 0 0,8 0 0,-2 0 0,6 0 0,11 0 0,-2 0 0,7 0 0,3 0 0,-1 0 0,0 0 0,-2 0 0,1 0 0,0 0 0,3 0 0,-2 1 0,2-1 0,-2 3 0,3-3 0,-1 1 0,1-1 0,1 0 0,-2 0 0,0 0 0,-4 1 0,-2 1 0,-5 2 0,5-1 0,0-1 0,7-1 0,2-1 0</inkml:trace>
+  <inkml:trace contextRef="#ctx0" brushRef="#br1" timeOffset="192066">5993 8813 24575,'2'8'0,"0"-1"0,-2 2 0,1-2 0,-1 0 0,0-3 0,2 0 0,-2 0 0,1 0 0,-1 1 0,0-1 0,1 3 0,0-2 0,0 3 0,-1 1 0,0-1 0,0-3 0,0 0 0,0-2 0,0 0 0,0-1 0,0 1 0,0 1 0,0-1 0,0 1 0,0 1 0,0 1 0,0 2 0,0 0 0,0 1 0,0-1 0,0 3 0,0-3 0,0 1 0,0-2 0,0 0 0,0-3 0,0 0 0,0-1 0,0 0 0,0 2 0,0-1 0,0 1 0,0-1 0,0 1 0,0 0 0,0 1 0,0-3 0,0 2 0,0-2 0,0 0 0,0-1 0,0 1 0,0 0 0,-1-1 0,0 1 0,0 0 0,0-1 0,1 1 0,-2-3 0,1-4 0,0-3 0,-1-8 0,2 4 0,0-3 0,0 3 0,0 0 0,0 2 0,0-1 0,0 2 0,0 1 0,0 1 0,0 1 0,0 2 0,0-1 0,0-2 0,0 0 0,0 0 0,0 0 0,-1 0 0,1 0 0,-1-2 0,1 2 0,0 1 0,0-3 0,0 3 0,0-1 0,0 2 0,0 0 0,0 1 0,0-1 0,0 1 0,0 0 0,0-2 0,0 1 0,0-3 0,0 0 0,0 3 0,0-1 0,0 2 0,0 0 0,0 0 0,0 9 0,0 0 0,0 10 0,0-5 0,0 5 0,0-7 0,0 4 0,0-3 0,0 3 0,0-3 0,0 0 0,0-2 0,0-1 0,0 4 0,0-5 0,0 2 0,0 3 0,0-2 0,0 4 0,0-2 0,0-1 0,0-1 0,0-1 0,0 1 0,0 0 0,0-1 0,0-3 0,0-1 0,-2-1 0,2-2 0,-1 0 0</inkml:trace>
+  <inkml:trace contextRef="#ctx0" brushRef="#br1" timeOffset="231866">5768 8339 24575,'4'35'0,"1"-2"0,-1 1 0,2 1 0,-4-10 0,2 0 0,-3-6 0,1-9 0,-1-2 0,0-3 0,-1-2 0,2-2 0</inkml:trace>
+  <inkml:trace contextRef="#ctx0" brushRef="#br1" timeOffset="233049">5820 8443 24575,'4'-5'0,"0"1"0,-1 2 0,3-2 0,-2 1 0,3-1 0,-4 1 0,5 0 0,-5 1 0,5-1 0,-4 1 0,3 0 0,-1-1 0,3 0 0,-3 2 0,1-2 0,0 3 0,0-1 0,1 1 0,0 0 0,-2 0 0,-1 0 0,-2 0 0,0 0 0,1 1 0,0 0 0,0 2 0,5 2 0,-3-2 0,3 4 0,-3-4 0,2 3 0,-3-2 0,2 3 0,-1-2 0,0 1 0,-1-2 0,-1 0 0,-1-2 0,0 1 0,-1 0 0,1-1 0,0 1 0,-2 0 0,2 1 0,-3 0 0,2 3 0,1-2 0,0 3 0,1-2 0,-3 1 0,2-1 0,-3-1 0,3-1 0,-3-2 0,1-1 0</inkml:trace>
+  <inkml:trace contextRef="#ctx0" brushRef="#br1" timeOffset="237399">6070 9032 24575,'11'-2'0,"-2"2"0,4-3 0,-3 1 0,-1 1 0,-2 0 0,1 1 0,-4 0 0,1 0 0,-2 0 0,0 0 0,-1 0 0,2 0 0,2 0 0,19 0 0,1 0 0,-5-1 0,0 2 0,16 1 0,-8 0 0,-9 3 0,-9-4 0,-5 0 0,0-1 0,1 0 0,-1 0 0,0 0 0,-1 0 0,-1 0 0,0 0 0,1 0 0,2 0 0,1 0 0,2 0 0,-2 0 0,1 0 0,2 0 0,-2 0 0,-1 0 0,-2 0 0,-3 0 0,0 1 0,1 0 0,3 0 0,-1-1 0,3 0 0,3 0 0,-3 0 0,4 0 0,3 0 0,7 0 0,8 0 0,0 0 0,-9 0 0,0 0 0,-11 0 0,12 0 0,-10 0 0,5 0 0,-6 0 0,-3 0 0,-1 0 0,0 0 0,0 0 0,12 0 0,-1 0 0,13 0 0,-1 0 0,6 0 0,-15 0 0,-1 0 0,12 0 0,3 0 0,-17 0 0,11 0 0,-15 0 0,14 0 0,-16 0 0,7 0 0,1 0 0,8 0 0,-5 0 0,0 0 0,13 0 0,-15 0 0,-1 0 0,12 0 0,2 0 0,-11 0 0,-1 0 0,2 0 0,-7 0 0,6 0 0,-5 0 0,6 0 0,0 0 0,6 0 0,1 0 0,-14 0 0,1 0 0,2 1 0,1 1 0,3 0 0,0 0 0,-2 0 0,0 0 0,2 0 0,-1-1 0,13-1 0,-9 0 0,1 0 0,-2 0 0,-7 0 0,4 2 0,-7-2 0,-3 2 0,3-2 0,-5 0 0,11 0 0,-9 1 0,20-1 0,-8 1 0,5-1 0,-2 0 0,-5 0 0,-1 0 0,1 0 0,0 0 0,-5 2 0,-1-1 0,-1 0 0,-3-1 0,3 0 0,-5 0 0,0 0 0,0 0 0,11 0 0,3 0 0,11 0 0,-1 3 0,-14-2 0,-1-1 0,1 1 0,0 1 0,4-2 0,-1 0 0,10 0 0,-8 0 0,-14 0 0,-4 0 0,3 0 0,0 0 0,0 0 0,-1 0 0,7 0 0,-3 0 0,5 0 0,3 0 0,-4 0 0,1 0 0,-5 0 0,-3 0 0,-1 0 0,-2 0 0,-2 0 0,0 0 0,-2 0 0,0 0 0,2 0 0,0 0 0,-2 0 0,1 0 0,-5 0 0,0 0 0</inkml:trace>
+  <inkml:trace contextRef="#ctx0" brushRef="#br1" timeOffset="238782">9083 8872 24575,'0'7'0,"0"0"0,0-3 0,0 4 0,0-3 0,0 11 0,0 0 0,0 4 0,0 3 0,0-8 0,0 2 0,0-9 0,0 2 0,0-2 0,0 0 0,1-3 0,-1 0 0,1-1 0,-1 0 0,2 2 0,-2-3 0,1 3 0,0 1 0,0-1 0,0 4 0,0-5 0,-1 6 0,1-2 0,1 8 0,-1-7 0,0 6 0,-1-10 0,0 5 0,0-5 0,2 3 0,0-1 0,0-2 0,0 2 0,0-2 0,-2-2 0,0 0 0,0-2 0,0 2 0,0-1 0,0 2 0,0-2 0,0 1 0,0-1 0,0 0 0,0-1 0,0 1 0,0 0 0,0-1 0,0 1 0,1 2 0,0 2 0,2 0 0,-1-1 0,-1-4 0</inkml:trace>
+  <inkml:trace contextRef="#ctx0" brushRef="#br1" timeOffset="240567">8910 8406 24575,'-3'-3'0,"0"0"0,3-1 0,-1-1 0,1-3 0,0-2 0,4 2 0,4-3 0,-1 7 0,0-3 0,-4 6 0,0 0 0,0 1 0,-1 0 0,2 0 0,3 1 0,1 4 0,2 2 0,-2 4 0,-2 0 0,-1 2 0,-1-1 0,-2 10 0,-1 3 0,-1-3 0,-3 7 0,1-18 0,-2 6 0,-6-5 0,4 0 0,-6 3 0,5-3 0,-1 0 0,0-1 0,2-2 0,-2-1 0,2-5 0,-1-1 0,1-2 0,1 0 0,-1-2 0,1 0 0,0-3 0,1 1 0,0 0 0,2-2 0,1 2 0,1 0 0,0 0 0,2-1 0,3 1 0,0 1 0,1 1 0,7 4 0,7 15 0,-2-8 0,4 11 0,-16-14 0,2-1 0,1 2 0,2-1 0,2 3 0,0-3 0,0 0 0,1-5 0,5 1 0,2-5 0,0-2 0,-7-1 0,-3 0 0,-8 5 0,-1-1 0</inkml:trace>
+  <inkml:trace contextRef="#ctx0" brushRef="#br1" timeOffset="242149">9191 8514 24575,'0'-12'0,"0"2"0,3 2 0,0 1 0,3 0 0,1 3 0,0 1 0,2 2 0,17 1 0,8 0 0,-15 2 0,1 1 0,10 1 0,-7 7 0,-9-4 0,1 2 0,-6-3 0,-2 5 0,0 1 0,-3 8 0,-6 6 0,-14 8 0,6-15 0,-1 0 0,-2-2 0,0-2 0,-6 4 0,6-7 0,7-10 0,0 0 0,2-1 0,-2 0 0,1 0 0,-6-1 0,-1 0 0,-4 0 0,2-1 0,4-1 0,-3-4 0,5 0 0,-18-17 0,11-1 0,4 8 0,1 0 0,-4-14 0,8 10 0,-2 3 0,6 5 0,-2 0 0,3 3 0,-3-1 0,3 3 0,0-1 0,1 0 0,-1-4 0,-3-4 0,0-2 0,0 0 0,2 6 0,2 2 0,0 3 0,0 2 0,0 1 0,0 1 0,0-1 0,0 1 0,0-1 0,1 1 0,2-2 0,6-1 0,3 0 0,20-3 0,-12 2 0,2 0 0,9 0 0,1 0-625,-8 0 0,0 0 625,4 1 0,-2 1 0,0-2-268,-8 2 0,1 1 268,13-4 0,-13 3 0,0 0 0,12-3 0,-6 2 0,-12 2 0,-6 2 0,-5 2 0,-1 0 0</inkml:trace>
+  <inkml:trace contextRef="#ctx0" brushRef="#br1" timeOffset="245382">6016 9020 24575,'-11'-2'0,"-1"0"0,3 1 0,-8-1 0,-5-1 0,-10-1 0,0 0 0,6 1 0,5 3 0,7 0 0,0 0 0,5 0 0,-2 0 0,4 0 0,-10 0 0,1 0 0,-3 0 0,-5 0 0,5 0 0,-6 0 0,4 0 0,-1 0 0,-12 0 0,13 0 0,2 0 0,-7 0 0,8 0 0,5 0 0,-3 0 0,0 0 0,-5 0 0,2 0 0,2 0 0,5 0 0,0 0 0,0 0 0,-5 0 0,-3 0 0,-10 0 0,12 0 0,-2 0 0,1 0 0,0 0 0,-18 0 0,10 0 0,4 0 0,2 0 0,3 0 0,3 0 0,4 0 0,5 0 0,-2 0 0,-3 0 0,4 0 0,-3 0 0,-1 0 0,-1 0 0,-3 0 0,-1 0 0,-1 0 0,-1 0 0,0 0 0,2 0 0,-2 0 0,6 0 0,-11 0 0,13 0 0,-5 0 0,4 0 0,2 0 0,-3 0 0,3 0 0,-2 0 0,-1 0 0,-3 0 0,-2 0 0,0 0 0,-1 0 0,4 0 0,-3 0 0,0 0 0,4 0 0,-3 0 0,7 0 0,0 0 0,-2 0 0,4 0 0,-4 0 0,0 0 0,-7 0 0,-3 0 0,-3 0 0,-5 0 0,4 0 0,-5 0 0,6 0 0,3-1 0,3 0 0,-2-1 0,7 2 0,-5 0 0,9 0 0,-8-2 0,9 1 0,-7-2 0,7 2 0,-3-1 0,2 0 0,-1 0 0,1 1 0,0 0 0,-4-1 0,-9 0 0,8-1 0,-9 0 0,-1 1 0,-8 2 0,-1 0-642,9 0 0,-1 0 642,5 0 0,0 0 0,1 0 0,-2 0 0,-2 0 0,1 0 0,-7 0 0,2 0 0,11 0 0,10 0 0,3 0 1284,-1 0-1284,1 0 0,-2 0 0,1 0 0,-2 0 0,2 0 0,1 0 0,-6 0 0,1 0 0,-8 0 0,7 0 0,-1 0 0,6 0 0,1 0 0,1 0 0,-1 0 0,0 0 0,-3 0 0,1 0 0,-2 0 0,3 0 0,3 0 0,0 0 0</inkml:trace>
+  <inkml:trace contextRef="#ctx0" brushRef="#br1" timeOffset="247233">3634 8765 24575,'1'4'0,"0"1"0,-1-1 0,0 2 0,1-1 0,0 3 0,0 1 0,1 8 0,0-1 0,1 10 0,-1-5 0,-1 3 0,1-4 0,-3-3 0,2-2 0,-5-1 0,3-6 0,0 1 0,1-4 0,2 0 0,-2 0 0,0 0 0,0-1 0,-2 4 0,1-1 0,-2 7 0,1-1 0,-4 4 0,3-3 0,0-5 0,3 0 0,-5 0 0,4 0 0,-4-2 0,4-4 0,-1 0 0,0 0 0,0-1 0,1 1 0,0 1 0,-1-1 0,1 1 0,-1-3 0,2 0 0</inkml:trace>
+  <inkml:trace contextRef="#ctx0" brushRef="#br1" timeOffset="248416">2894 8968 24575,'10'-3'0,"8"2"0,-7 1 0,4 0 0,-5 0 0,-4 0 0,3 0 0,-3 0 0,1 0 0,-2 0 0,1 0 0,1 1 0,1-1 0,-1 1 0,-1-1 0,-2 0 0,-3 0 0,0 0 0</inkml:trace>
+  <inkml:trace contextRef="#ctx0" brushRef="#br1" timeOffset="249833">3144 8859 24575,'2'-7'0,"1"0"0,3 1 0,0 0 0,0 4 0,0 0 0,0 2 0,0 4 0,0-1 0,0 7 0,-2-4 0,1 11 0,-2-7 0,1 8 0,0 0 0,0 18 0,-3-16 0,1 0 0,1 5 0,-3 0 0,-5-3 0,0-1 0,-1 6 0,-7-7 0,6-10 0,3-5 0,-3-1 0,2-3 0,0-1 0,1 0 0,1 0 0,-1-3 0,-1-2 0,2-2 0,-1 0 0,6 2 0,1 2 0,13 0 0,-6 2 0,11 4 0,-15-1 0,2 2 0,-6-2 0,0-1 0,1-1 0,0 0 0,-1 0 0,5 0 0,1 0 0,6-6 0,-3 0 0,0-5 0,-7 5 0,-2 3 0</inkml:trace>
+  <inkml:trace contextRef="#ctx0" brushRef="#br1" timeOffset="251466">3328 8974 24575,'4'-6'0,"-1"2"0,1 1 0,-1 2 0,0 1 0,2 0 0,0 0 0,-1 0 0,1 1 0,-2 1 0,0 1 0,0 2 0,-1-1 0,1 2 0,0 0 0,0 1 0,-1 6 0,-3 2 0,0 11 0,-20-13 0,-2 0 0,11 11 0,-10-14 0,2-3 0,16-2 0,1-2 0,1-1 0,-1 0 0,-1 0 0,0-2 0,-2 2 0,2-2 0,0 0 0,-1-3 0,-7-7 0,4 0 0,-4-4 0,9 6 0,2-2 0,0 4 0,1-1 0,-1 2 0,1-2 0,0 1 0,12-19 0,-6 1 0,2 6 0,0 0 0,-4-13 0,0 7 0,-2 5 0,0 6 0,-1 5 0,-1 1 0,1 4 0,0-2 0,0 2 0,1-5 0,-1 4 0,3-4 0,-1 2 0,4-6 0,-1 2 0,2-2 0,-3 4 0,0 1 0,-1 1 0,2 1 0,-3 2 0,-1-1 0,1 1 0,-3 2 0,1 0 0</inkml:trace>
+  <inkml:trace contextRef="#ctx0" brushRef="#br1" timeOffset="330800">3559 6688 24575,'5'-1'0,"0"1"0,-2-3 0,1 2 0,1-2 0,0 0 0,1 1 0,0 0 0,2 0 0,0 0 0,0 1 0,3-1 0,0 2 0,-3 0 0,1 0 0,-5-1 0,4-1 0,-3 0 0,3 1 0,-4 1 0,4-2 0,-2 2 0,1-1 0,-1 0 0,-3 0 0,3 0 0,-3 0 0,8-2 0,8-7 0,-2 2 0,1 0 0,-1 1 0,-5 0 0,17-5 0,-19 7 0,4-2 0,-8 4 0,-4 0 0,1-4 0,5 4 0,-1-6 0,7 6 0,-5-1 0,4 0 0,-2 0 0,1-1 0,-1 0 0,1 4 0,5-4 0,8-2 0,-4 2 0,15-5 0,-16 9 0,5-4 0,-1 4 0,-5-3 0,6 3 0,-4-2 0,0 0 0,-1-1 0,1 1 0,12 1 0,2-1 0,-3 0 0,0 1 0,3 2 0,1 0 0,-11 0 0,1 0 0,-2 0 0,9 0 0,-1 0 0,-2 0 0,-2 0 0,-5 0 0,-3 0 0,5 0 0,-8 0 0,-5 0 0,-3 0 0,13 0 0,-13 0 0,14 0 0,-15 1 0,3 2 0,0 1 0,-1 1 0,-1 2 0,9 3 0,-4 0 0,13 3 0,-14-5 0,4 1 0,-2-1 0,-5-2 0,12 5 0,-6-5 0,13 7 0,2-3 0,-10-4 0,1-1 0,0 0 0,0-2 0,1 1 0,-1-1 0,0 0 0,-2 0 0,12 0 0,-6 0 0,-2-3 0,-11 0 0,4 0 0,-11-1 0,5 1 0,-2-3 0,0 1 0,2-2 0,-2 1 0,3-1 0,-1 0 0,12-3 0,-3-1 0,16-4 0,-17 1 0,1 1 0,-13 11 0,-3 5 0,1 5 0,-1 2 0,4-3 0,-5-3 0,2 0 0,-1-2 0,-1-2 0,1 1 0,2-1 0,2-1 0,4 2 0,11 3 0,-6-3 0,3 1 0,11 3 0,2 1-392,-8-4 0,1-1 1,1 0 391,7 2 0,3 2 0,0-2-471,-10-2 0,1-1 0,0 1 0,1-1 471,4 2 0,1-1 0,0 1 0,0 0 0,-2-1 0,-1 1 0,0-1 0,0 1 0,0 0 0,1 1 0,-2 0 0,-1-2 0,2 0 0,-3-1 0,0 1 0,-3 1 0,0 0 0,-1 0 0,2-3 0,0 1 0,2 1 0,1 0 0,-3 1 0,1-1-276,0-2 1,3-1 0,-1 1 275,2 1 0,0 0 0,1-1 0,-4-1 0,2-1 0,0 0 0,0 0 0,-1 1 0,0 1 0,0-1 0,0 0 0,8-1 0,-1 0 0,0 0 0,-3 0 0,-1 0 0,0 0 0,1 0 0,-1 0 0,-1 0 0,-2 0 0,-2 0 0,1 0 0,2 0 0,0 0 0,-1 0 0,8 0 0,-2 0 0,-2 0 0,-2 0 0,-5 0 0,-3 0 0,10 0 0,-12 0 0,0 0 0,7 0 0,8-3 0,-6-1 1010,-1 1-1010,7 0 1903,-2 0-1903,3 0 486,-16 0 0,1-1-486,2 1 0,2 0 0,-2 0 0,2 0 0,-1 1-1002,7-1 1,-1 1 1001,7 0 0,-2 0 0,-9 2 0,-2 0-638,1-2 1,0 0 637,-1 2 0,1-1 0,3-2 0,0-2 0,-4 3 0,3 0 0,-1 0 0,3 0 0,-1 0-234,-2 1 0,0 0 0,1 0 234,5-1 0,2 1 0,0 0 0,-1 1 0,-1 0 0,1-1 0,1 0 0,-1 0 0,1 0 0,-2 1 0,0 0 0,-1 0 0,-2 0 0,-2 0 0,-2 0-22,1 0 1,-3 1 21,0 1 1784,-17 0-1784,-4 1 1352,2 1-1352,-1-1 834,0 3-834,-2-1 0,0-1 0,-1-2 0</inkml:trace>
+  <inkml:trace contextRef="#ctx0" brushRef="#br1" timeOffset="332800">5225 5402 24575,'-6'33'0,"0"1"0,0-8 0,0 1 0,-2 3 0,1-1 0,-2 2 0,-1 1 0,0-1-770,-1 1 1,0-1 0,-1 0 0,0-1 769,1-3 0,0 0 0,-1-1 0,-1-1 0,-3 4 0,-2 0 0,0-3 323,0-5 1,-1-1-1,2-2-323,-1 0 0,2-3 0,-14 6 506,25-15-506,3-3 0,-1 0 0,5-21 0,5-2 0,3-4 0,0-1 0,0-3 0,2 0 35,3-5 0,1-1 1,1 0-36,-3 8 0,0 0 0,1 0 0,-2 2 0,1-1 0,0 1 0,-1 2 0,4-3 0,-1 3 0,-1 2 0,-7 8 0,-1 0 0,0 3 0,1-2 0,2-3 0,-2-2 1495,2-1-1495,-6 6 0,-2 4 0,-2 5 0,0 19 0,0 5 0,2-1 0,0 2-637,0 0 0,1 0 637,1 3 0,1 0 0,-2-3 0,2-1 0,-1-2 0,2-1 0,7 14 0,-2-12 0,1-4 0,9-10 0,15-8 0,-9-4 0,3-4 0,-5 1 0,1-2 0,0 0 0,-2-1 0,-2 0 0,1-2 0,-1 0 0,-1-2 0,-1 1 637,0-1 0,-3 2-637,2-9 0,-10 11 0,-13 13 0,4 14 0,-9 16 0,8-9 0,1 0-819,-2 3 1,0 0 818,2 2 0,0 1 0,0 1 0,0-1 0,4 1 0,0-1 0,0 0 0,2 0 0,1-6 0,2-1 0,2 6 0,0 0 0,-3-11 0,0 0 0,1 1 0,0-1 0,0-2 0,-3-11 0,-1 0 0,-4-4 0,1 0 0</inkml:trace>
+  <inkml:trace contextRef="#ctx0" brushRef="#br1" timeOffset="333765">5830 6055 12331,'0'14'0,"10"5"3276,-4 6-1811,10 3-400,-11-8 1,0 2-1066,4 6 0,0 2 0,0 6 0,0 0 0,1 0 0,0-1 0,-3-3 0,0-2 1194,1 6-1194,-5-10 3276,0-15-3053,-3-10 0,2 2 1,-2-5-1</inkml:trace>
+  <inkml:trace contextRef="#ctx0" brushRef="#br1" timeOffset="334716">5848 6197 24575,'0'-8'0,"0"-7"0,0-2 0,0-12 0,2-2 0,0 8 0,1 3 0,7 9 0,-6 5 0,5-4 0,-7 6 0,1 0 0,1-3 0,2 1 0,1 0 0,5 0 0,-1 1 0,6 2 0,-6 2 0,3 1 0,-5 0 0,-2 0 0,-3 1 0,0 2 0,-1 0 0,4 4 0,-2 0 0,5 16 0,-4-1 0,-1 14 0,-2-13 0,-3 2 0,-2-15 0,0 6 0,-3-7 0,0 2 0,1-5 0,0-2 0,1-3 0,1 2 0,-4-2 0,-3 1 0,-5-1 0,-2 0 0,3-1 0,5 1 0,4-1 0,3 0 0</inkml:trace>
+  <inkml:trace contextRef="#ctx0" brushRef="#br1" timeOffset="335983">3628 6672 24575,'-7'0'0,"1"0"0,-1 0 0,0 0 0,1 0 0,1 0 0,-1 0 0,2 0 0,-1 0 0,1 0 0,-2 0 0,2 0 0,-1 0 0,2 0 0,-1 0 0,3 0 0,-1 0 0</inkml:trace>
+  <inkml:trace contextRef="#ctx0" brushRef="#br1" timeOffset="345150">6102 6100 24575,'26'-21'0,"0"0"0,0 0 0,0-1 0,-2 3 0,0 0 0,0-1 0,2 0 0,1 0 0,-3 2 0,2 0 0,0-1 0,2 0 0,-1 1 0,0-1 0,0 1-547,3-3 1,1 1 0,-1 0 0,0 0 0,1 0 0,0 2-1,1 1 1,0 1 0,1 1 0,0 0 0,0 0 0,0-1 370,-3 2 0,1 0 0,0 0 0,0-1 0,0 1 0,1 0 0,-1 0-237,3 1 1,-1-1 0,1 1 0,0 0 0,0 0 0,1 0 0,0-1 412,-1 2 0,0-1 0,0 1 0,1-1 0,0 0 0,-1 1 0,1 0 0,-1 0 0,-2 0 0,0 1 0,-1 0 0,1 0 0,-1 0 0,1 1 0,-1-1 0,1 1 0,1 0 0,0 1 0,1 0 0,-1 0 0,0 0 0,1 0 0,-1 1 0,-1 0-275,3-1 0,0 0 0,-1 1 1,0-1-1,0 1 0,-1 0 0,-1 1 275,0-1 0,-1 0 0,0 1 0,-1 0 0,0 0 0,0 1 0,3-1 0,1 1 0,0-1 0,-2 1 0,-3 0-490,6-3 0,-3 1 1,0 0 489,1 1 0,-1 0 0,0 0 0,-2 0 0,0 0 0,2 1 0,-4 0 0,1 1 0,2 0 0,1 1 98,-3 1 1,2 1 0,0 0 0,2 0 0,-1 0-99,-1 0 0,1 0 0,0 1 0,0-1 0,1 1 0,0 0 0,4 1 0,-1 0 0,2 0 0,-1 0 0,1 0 0,-1 0 136,-2 0 0,1 0 1,-1 0-1,0 0 1,0 0-1,-1 0-136,4 0 0,0 0 0,0 0 0,-2 0 0,-2 0 0,2 0 0,-3 0 0,0 0 0,-3 0 1092,-2 0 0,-1 0 0,-4 0-1087,12 0 2517,-21 0-2522,-2 2 2426,18 2-2426,-8-1 0,-1 1 0,1-1 0,4 1 3276,-1 0-2998,-7-1 691,-8-2-969,0-1 0,-3 1 0,-2-1 0,-2 0 0,-2 0 0</inkml:trace>
+  <inkml:trace contextRef="#ctx0" brushRef="#br1" timeOffset="345766">10507 4775 24575,'31'13'0,"1"0"0,-10-2 0,0 0 0,7 2 0,-1-1 0,0 2 0,-18-8 0,-1-2 0,-6 2 0,-2-3 0,0 6 0,-1-1 0,0 10 0,0-8 0,-10 16 0,5-18 0,-7 7 0,-3 1 0,-8 0 0,1-2 0,-3 0 0,-4 1 0,0-1 0,-1-1 0,1 1 0,4-1 0,2 0 0,-3 5 0,16-11 0,7-3 0,2-2 0,1-1 0</inkml:trace>
+</inkml:ink>
+</file>
+
+<file path=ppt/ink/ink7.xml><?xml version="1.0" encoding="utf-8"?>
+<inkml:ink xmlns:inkml="http://www.w3.org/2003/InkML">
+  <inkml:definitions>
+    <inkml:context xml:id="ctx0">
+      <inkml:inkSource xml:id="inkSrc0">
+        <inkml:traceFormat>
+          <inkml:channel name="X" type="integer" min="-2.14748E9" max="2.14748E9" units="cm"/>
+          <inkml:channel name="Y" type="integer" min="-2.14748E9" max="2.14748E9" units="cm"/>
+          <inkml:channel name="F" type="integer" max="32767" units="dev"/>
+        </inkml:traceFormat>
+        <inkml:channelProperties>
+          <inkml:channelProperty channel="X" name="resolution" value="1000" units="1/cm"/>
+          <inkml:channelProperty channel="Y" name="resolution" value="1000" units="1/cm"/>
+          <inkml:channelProperty channel="F" name="resolution" value="0" units="1/dev"/>
+        </inkml:channelProperties>
+      </inkml:inkSource>
+      <inkml:timestamp xml:id="ts0" timeString="2024-10-01T09:01:51.760"/>
+    </inkml:context>
+    <inkml:brush xml:id="br0">
+      <inkml:brushProperty name="width" value="0.05292" units="cm"/>
+      <inkml:brushProperty name="height" value="0.05292" units="cm"/>
+      <inkml:brushProperty name="color" value="#002060"/>
+    </inkml:brush>
+  </inkml:definitions>
+  <inkml:trace contextRef="#ctx0" brushRef="#br0">16493 10645 24575,'-26'17'0,"1"0"0,-1 3 0,3 3 0,1 1 0,4-6 0,-1 0 0,4 1 0,4 4 0,3-1 0,-1 11 0,1 2 0,6-16 0,0-2 0,2-8 0,3 8 0,-3-11 0,6 13 0,-1 1 0,-1 5 0,3 11 0,-5-13 0,-1 0 0,1-1 0,-1 2 0,1 9 0,-1 2 0,0 0 0,-2 0-853,2-9 1,-1 1-1,-1-2 853,0 12 0,-1-2 0,0-3 0,-1-1-605,-1-5 0,-1-1 605,-2-1 0,-1-2-30,0 10 30,-5-2 0,8-17 0,-1 10 2381,-1-5-2381,2 0 1379,0-4-1379,2-7 38,1-2-38,0-2 0,14 16 0,-5-3 0,5 1 0,-1 1 0,0 7 0,2 5 0,-7-12 0,-1 0 0,-3-9 0,0 2 0,-2-2 0,0 3 0,0 6 0,0-5 0,2 8 0,-1 5 0,0-1 0,-1 3 0,1-1 0,1 2 0,-1-1 0,-1-1 0,0-1 0,0-1 0,0 8 0,0-2 0,-1-9 0,2-1 0,1 11 0,5 4 0,-2-15 0,1 0 0,-1 4 0,0 0 0,0-5 0,0-1 0,-1 5 0,-2-1 0,2 5 0,0 0 0,-1-6 0,0-11 0,8 18 0,-4-3 0,8 5 0,1-2 0,-4-13 0,1-4 0,-8-9 0,-2-2 0,1-1 0,-2 0 0,0 0 0,-1 0 0</inkml:trace>
+</inkml:ink>
+</file>
+
+<file path=ppt/ink/ink8.xml><?xml version="1.0" encoding="utf-8"?>
+<inkml:ink xmlns:inkml="http://www.w3.org/2003/InkML">
+  <inkml:definitions>
+    <inkml:context xml:id="ctx0">
+      <inkml:inkSource xml:id="inkSrc0">
+        <inkml:traceFormat>
+          <inkml:channel name="X" type="integer" min="-2.14748E9" max="2.14748E9" units="cm"/>
+          <inkml:channel name="Y" type="integer" min="-2.14748E9" max="2.14748E9" units="cm"/>
+          <inkml:channel name="F" type="integer" max="32767" units="dev"/>
+        </inkml:traceFormat>
+        <inkml:channelProperties>
+          <inkml:channelProperty channel="X" name="resolution" value="1000" units="1/cm"/>
+          <inkml:channelProperty channel="Y" name="resolution" value="1000" units="1/cm"/>
+          <inkml:channelProperty channel="F" name="resolution" value="0" units="1/dev"/>
+        </inkml:channelProperties>
+      </inkml:inkSource>
+      <inkml:timestamp xml:id="ts0" timeString="2024-10-01T09:03:24.949"/>
+    </inkml:context>
+    <inkml:brush xml:id="br0">
+      <inkml:brushProperty name="width" value="0.05292" units="cm"/>
+      <inkml:brushProperty name="height" value="0.05292" units="cm"/>
+      <inkml:brushProperty name="color" value="#002060"/>
+    </inkml:brush>
+  </inkml:definitions>
+  <inkml:trace contextRef="#ctx0" brushRef="#br0">3476 3989 24575,'0'0'0</inkml:trace>
+</inkml:ink>
+</file>
+
 <file path=ppt/notesMasters/notesMaster1.xml><?xml version="1.0" encoding="utf-8"?>
 <p:notesMaster xmlns:a="http://schemas.openxmlformats.org/drawingml/2006/main" xmlns:r="http://schemas.openxmlformats.org/officeDocument/2006/relationships" xmlns:p="http://schemas.openxmlformats.org/presentationml/2006/main">
   <p:cSld>
@@ -283,7 +510,7 @@
           <a:p>
             <a:fld id="{274136F6-DD71-7F46-84B0-22AA1F473099}" type="datetimeFigureOut">
               <a:rPr lang="en-PT" smtClean="0"/>
-              <a:t>9/24/24</a:t>
+              <a:t>9/30/24</a:t>
             </a:fld>
             <a:endParaRPr lang="en-PT"/>
           </a:p>
@@ -2293,7 +2520,7 @@
           <a:p>
             <a:fld id="{1D8BD707-D9CF-40AE-B4C6-C98DA3205C09}" type="datetimeFigureOut">
               <a:rPr lang="en-US"/>
-              <a:t>9/24/24</a:t>
+              <a:t>9/30/24</a:t>
             </a:fld>
             <a:endParaRPr lang="en-US"/>
           </a:p>
@@ -2470,7 +2697,7 @@
           <a:p>
             <a:fld id="{1D8BD707-D9CF-40AE-B4C6-C98DA3205C09}" type="datetimeFigureOut">
               <a:rPr lang="en-US"/>
-              <a:t>9/24/24</a:t>
+              <a:t>9/30/24</a:t>
             </a:fld>
             <a:endParaRPr lang="en-US"/>
           </a:p>
@@ -2684,7 +2911,7 @@
           <a:p>
             <a:fld id="{1D8BD707-D9CF-40AE-B4C6-C98DA3205C09}" type="datetimeFigureOut">
               <a:rPr lang="en-US"/>
-              <a:t>9/24/24</a:t>
+              <a:t>9/30/24</a:t>
             </a:fld>
             <a:endParaRPr lang="en-US"/>
           </a:p>
@@ -2840,7 +3067,7 @@
           <a:p>
             <a:fld id="{1D8BD707-D9CF-40AE-B4C6-C98DA3205C09}" type="datetimeFigureOut">
               <a:rPr lang="en-US"/>
-              <a:t>9/24/24</a:t>
+              <a:t>9/30/24</a:t>
             </a:fld>
             <a:endParaRPr lang="en-US"/>
           </a:p>
@@ -2959,7 +3186,7 @@
           <a:p>
             <a:fld id="{1D8BD707-D9CF-40AE-B4C6-C98DA3205C09}" type="datetimeFigureOut">
               <a:rPr lang="en-US"/>
-              <a:t>9/24/24</a:t>
+              <a:t>9/30/24</a:t>
             </a:fld>
             <a:endParaRPr lang="en-US"/>
           </a:p>
@@ -3837,7 +4064,7 @@
           <a:p>
             <a:fld id="{1D8BD707-D9CF-40AE-B4C6-C98DA3205C09}" type="datetimeFigureOut">
               <a:rPr lang="en-US"/>
-              <a:t>9/24/24</a:t>
+              <a:t>9/30/24</a:t>
             </a:fld>
             <a:endParaRPr lang="en-US"/>
           </a:p>
@@ -6861,6 +7088,57 @@
           </a:p>
         </p:txBody>
       </p:sp>
+      <mc:AlternateContent xmlns:mc="http://schemas.openxmlformats.org/markup-compatibility/2006">
+        <mc:Choice xmlns:p14="http://schemas.microsoft.com/office/powerpoint/2010/main" Requires="p14">
+          <p:contentPart p14:bwMode="auto" r:id="rId2">
+            <p14:nvContentPartPr>
+              <p14:cNvPr id="4" name="Ink 3">
+                <a:extLst>
+                  <a:ext uri="{FF2B5EF4-FFF2-40B4-BE49-F238E27FC236}">
+                    <a16:creationId xmlns:a16="http://schemas.microsoft.com/office/drawing/2014/main" id="{740FE1AA-F41F-B516-82A4-637832E502F8}"/>
+                  </a:ext>
+                </a:extLst>
+              </p14:cNvPr>
+              <p14:cNvContentPartPr/>
+              <p14:nvPr/>
+            </p14:nvContentPartPr>
+            <p14:xfrm>
+              <a:off x="1251360" y="1436040"/>
+              <a:ext cx="360" cy="360"/>
+            </p14:xfrm>
+          </p:contentPart>
+        </mc:Choice>
+        <mc:Fallback>
+          <p:pic>
+            <p:nvPicPr>
+              <p:cNvPr id="4" name="Ink 3">
+                <a:extLst>
+                  <a:ext uri="{FF2B5EF4-FFF2-40B4-BE49-F238E27FC236}">
+                    <a16:creationId xmlns:a16="http://schemas.microsoft.com/office/drawing/2014/main" id="{740FE1AA-F41F-B516-82A4-637832E502F8}"/>
+                  </a:ext>
+                </a:extLst>
+              </p:cNvPr>
+              <p:cNvPicPr/>
+              <p:nvPr/>
+            </p:nvPicPr>
+            <p:blipFill>
+              <a:blip r:embed="rId3"/>
+              <a:stretch>
+                <a:fillRect/>
+              </a:stretch>
+            </p:blipFill>
+            <p:spPr>
+              <a:xfrm>
+                <a:off x="1242000" y="1426680"/>
+                <a:ext cx="19080" cy="19080"/>
+              </a:xfrm>
+              <a:prstGeom prst="rect">
+                <a:avLst/>
+              </a:prstGeom>
+            </p:spPr>
+          </p:pic>
+        </mc:Fallback>
+      </mc:AlternateContent>
     </p:spTree>
   </p:cSld>
   <p:clrMapOvr>
@@ -28957,6 +29235,57 @@
           </a:fontRef>
         </p:style>
       </p:cxnSp>
+      <mc:AlternateContent xmlns:mc="http://schemas.openxmlformats.org/markup-compatibility/2006">
+        <mc:Choice xmlns:p14="http://schemas.microsoft.com/office/powerpoint/2010/main" Requires="p14">
+          <p:contentPart p14:bwMode="auto" r:id="rId3">
+            <p14:nvContentPartPr>
+              <p14:cNvPr id="4" name="Ink 3">
+                <a:extLst>
+                  <a:ext uri="{FF2B5EF4-FFF2-40B4-BE49-F238E27FC236}">
+                    <a16:creationId xmlns:a16="http://schemas.microsoft.com/office/drawing/2014/main" id="{67BAA411-F8F0-815A-F60C-EF5572C3042B}"/>
+                  </a:ext>
+                </a:extLst>
+              </p14:cNvPr>
+              <p14:cNvContentPartPr/>
+              <p14:nvPr/>
+            </p14:nvContentPartPr>
+            <p14:xfrm>
+              <a:off x="792720" y="1321560"/>
+              <a:ext cx="4615560" cy="3317400"/>
+            </p14:xfrm>
+          </p:contentPart>
+        </mc:Choice>
+        <mc:Fallback>
+          <p:pic>
+            <p:nvPicPr>
+              <p:cNvPr id="4" name="Ink 3">
+                <a:extLst>
+                  <a:ext uri="{FF2B5EF4-FFF2-40B4-BE49-F238E27FC236}">
+                    <a16:creationId xmlns:a16="http://schemas.microsoft.com/office/drawing/2014/main" id="{67BAA411-F8F0-815A-F60C-EF5572C3042B}"/>
+                  </a:ext>
+                </a:extLst>
+              </p:cNvPr>
+              <p:cNvPicPr/>
+              <p:nvPr/>
+            </p:nvPicPr>
+            <p:blipFill>
+              <a:blip r:embed="rId4"/>
+              <a:stretch>
+                <a:fillRect/>
+              </a:stretch>
+            </p:blipFill>
+            <p:spPr>
+              <a:xfrm>
+                <a:off x="783360" y="1312200"/>
+                <a:ext cx="4634280" cy="3336120"/>
+              </a:xfrm>
+              <a:prstGeom prst="rect">
+                <a:avLst/>
+              </a:prstGeom>
+            </p:spPr>
+          </p:pic>
+        </mc:Fallback>
+      </mc:AlternateContent>
     </p:spTree>
     <p:extLst>
       <p:ext uri="{BB962C8B-B14F-4D97-AF65-F5344CB8AC3E}">
@@ -32798,6 +33127,108 @@
           </a:prstGeom>
         </p:spPr>
       </p:pic>
+      <mc:AlternateContent xmlns:mc="http://schemas.openxmlformats.org/markup-compatibility/2006">
+        <mc:Choice xmlns:p14="http://schemas.microsoft.com/office/powerpoint/2010/main" Requires="p14">
+          <p:contentPart p14:bwMode="auto" r:id="rId4">
+            <p14:nvContentPartPr>
+              <p14:cNvPr id="5" name="Ink 4">
+                <a:extLst>
+                  <a:ext uri="{FF2B5EF4-FFF2-40B4-BE49-F238E27FC236}">
+                    <a16:creationId xmlns:a16="http://schemas.microsoft.com/office/drawing/2014/main" id="{A2744FC7-F26C-8029-F647-80F6011226F6}"/>
+                  </a:ext>
+                </a:extLst>
+              </p14:cNvPr>
+              <p14:cNvContentPartPr/>
+              <p14:nvPr/>
+            </p14:nvContentPartPr>
+            <p14:xfrm>
+              <a:off x="1114200" y="2318760"/>
+              <a:ext cx="3458160" cy="2457360"/>
+            </p14:xfrm>
+          </p:contentPart>
+        </mc:Choice>
+        <mc:Fallback>
+          <p:pic>
+            <p:nvPicPr>
+              <p:cNvPr id="5" name="Ink 4">
+                <a:extLst>
+                  <a:ext uri="{FF2B5EF4-FFF2-40B4-BE49-F238E27FC236}">
+                    <a16:creationId xmlns:a16="http://schemas.microsoft.com/office/drawing/2014/main" id="{A2744FC7-F26C-8029-F647-80F6011226F6}"/>
+                  </a:ext>
+                </a:extLst>
+              </p:cNvPr>
+              <p:cNvPicPr/>
+              <p:nvPr/>
+            </p:nvPicPr>
+            <p:blipFill>
+              <a:blip r:embed="rId5"/>
+              <a:stretch>
+                <a:fillRect/>
+              </a:stretch>
+            </p:blipFill>
+            <p:spPr>
+              <a:xfrm>
+                <a:off x="1104840" y="2309400"/>
+                <a:ext cx="3476880" cy="2476080"/>
+              </a:xfrm>
+              <a:prstGeom prst="rect">
+                <a:avLst/>
+              </a:prstGeom>
+            </p:spPr>
+          </p:pic>
+        </mc:Fallback>
+      </mc:AlternateContent>
+      <mc:AlternateContent xmlns:mc="http://schemas.openxmlformats.org/markup-compatibility/2006">
+        <mc:Choice xmlns:p14="http://schemas.microsoft.com/office/powerpoint/2010/main" Requires="p14">
+          <p:contentPart p14:bwMode="auto" r:id="rId6">
+            <p14:nvContentPartPr>
+              <p14:cNvPr id="6" name="Ink 5">
+                <a:extLst>
+                  <a:ext uri="{FF2B5EF4-FFF2-40B4-BE49-F238E27FC236}">
+                    <a16:creationId xmlns:a16="http://schemas.microsoft.com/office/drawing/2014/main" id="{1577FF82-1F50-A855-6BE9-BD51593FABA8}"/>
+                  </a:ext>
+                </a:extLst>
+              </p14:cNvPr>
+              <p14:cNvContentPartPr/>
+              <p14:nvPr/>
+            </p14:nvContentPartPr>
+            <p14:xfrm>
+              <a:off x="4156920" y="1131840"/>
+              <a:ext cx="2093040" cy="2147760"/>
+            </p14:xfrm>
+          </p:contentPart>
+        </mc:Choice>
+        <mc:Fallback>
+          <p:pic>
+            <p:nvPicPr>
+              <p:cNvPr id="6" name="Ink 5">
+                <a:extLst>
+                  <a:ext uri="{FF2B5EF4-FFF2-40B4-BE49-F238E27FC236}">
+                    <a16:creationId xmlns:a16="http://schemas.microsoft.com/office/drawing/2014/main" id="{1577FF82-1F50-A855-6BE9-BD51593FABA8}"/>
+                  </a:ext>
+                </a:extLst>
+              </p:cNvPr>
+              <p:cNvPicPr/>
+              <p:nvPr/>
+            </p:nvPicPr>
+            <p:blipFill>
+              <a:blip r:embed="rId7"/>
+              <a:stretch>
+                <a:fillRect/>
+              </a:stretch>
+            </p:blipFill>
+            <p:spPr>
+              <a:xfrm>
+                <a:off x="4147560" y="1122480"/>
+                <a:ext cx="2111760" cy="2166480"/>
+              </a:xfrm>
+              <a:prstGeom prst="rect">
+                <a:avLst/>
+              </a:prstGeom>
+            </p:spPr>
+          </p:pic>
+        </mc:Fallback>
+      </mc:AlternateContent>
     </p:spTree>
     <p:extLst>
       <p:ext uri="{BB962C8B-B14F-4D97-AF65-F5344CB8AC3E}">
@@ -33419,6 +33850,57 @@
           </p:pic>
         </mc:Fallback>
       </mc:AlternateContent>
+      <mc:AlternateContent xmlns:mc="http://schemas.openxmlformats.org/markup-compatibility/2006">
+        <mc:Choice xmlns:p14="http://schemas.microsoft.com/office/powerpoint/2010/main" Requires="p14">
+          <p:contentPart p14:bwMode="auto" r:id="rId6">
+            <p14:nvContentPartPr>
+              <p14:cNvPr id="6" name="Ink 5">
+                <a:extLst>
+                  <a:ext uri="{FF2B5EF4-FFF2-40B4-BE49-F238E27FC236}">
+                    <a16:creationId xmlns:a16="http://schemas.microsoft.com/office/drawing/2014/main" id="{FDEF7D1E-6394-5B1D-3C64-2DBECEFFD46F}"/>
+                  </a:ext>
+                </a:extLst>
+              </p14:cNvPr>
+              <p14:cNvContentPartPr/>
+              <p14:nvPr/>
+            </p14:nvContentPartPr>
+            <p14:xfrm>
+              <a:off x="1041840" y="1719000"/>
+              <a:ext cx="2818800" cy="3150000"/>
+            </p14:xfrm>
+          </p:contentPart>
+        </mc:Choice>
+        <mc:Fallback>
+          <p:pic>
+            <p:nvPicPr>
+              <p:cNvPr id="6" name="Ink 5">
+                <a:extLst>
+                  <a:ext uri="{FF2B5EF4-FFF2-40B4-BE49-F238E27FC236}">
+                    <a16:creationId xmlns:a16="http://schemas.microsoft.com/office/drawing/2014/main" id="{FDEF7D1E-6394-5B1D-3C64-2DBECEFFD46F}"/>
+                  </a:ext>
+                </a:extLst>
+              </p:cNvPr>
+              <p:cNvPicPr/>
+              <p:nvPr/>
+            </p:nvPicPr>
+            <p:blipFill>
+              <a:blip r:embed="rId7"/>
+              <a:stretch>
+                <a:fillRect/>
+              </a:stretch>
+            </p:blipFill>
+            <p:spPr>
+              <a:xfrm>
+                <a:off x="1032480" y="1709640"/>
+                <a:ext cx="2837520" cy="3168720"/>
+              </a:xfrm>
+              <a:prstGeom prst="rect">
+                <a:avLst/>
+              </a:prstGeom>
+            </p:spPr>
+          </p:pic>
+        </mc:Fallback>
+      </mc:AlternateContent>
     </p:spTree>
     <p:extLst>
       <p:ext uri="{BB962C8B-B14F-4D97-AF65-F5344CB8AC3E}">
@@ -34624,6 +35106,57 @@
           </a:prstGeom>
         </p:spPr>
       </p:pic>
+      <mc:AlternateContent xmlns:mc="http://schemas.openxmlformats.org/markup-compatibility/2006">
+        <mc:Choice xmlns:p14="http://schemas.microsoft.com/office/powerpoint/2010/main" Requires="p14">
+          <p:contentPart p14:bwMode="auto" r:id="rId3">
+            <p14:nvContentPartPr>
+              <p14:cNvPr id="5" name="Ink 4">
+                <a:extLst>
+                  <a:ext uri="{FF2B5EF4-FFF2-40B4-BE49-F238E27FC236}">
+                    <a16:creationId xmlns:a16="http://schemas.microsoft.com/office/drawing/2014/main" id="{EFA9F45C-5149-617B-10B6-A66FB472A8D4}"/>
+                  </a:ext>
+                </a:extLst>
+              </p14:cNvPr>
+              <p14:cNvContentPartPr/>
+              <p14:nvPr/>
+            </p14:nvContentPartPr>
+            <p14:xfrm>
+              <a:off x="5841000" y="3832200"/>
+              <a:ext cx="96840" cy="801000"/>
+            </p14:xfrm>
+          </p:contentPart>
+        </mc:Choice>
+        <mc:Fallback>
+          <p:pic>
+            <p:nvPicPr>
+              <p:cNvPr id="5" name="Ink 4">
+                <a:extLst>
+                  <a:ext uri="{FF2B5EF4-FFF2-40B4-BE49-F238E27FC236}">
+                    <a16:creationId xmlns:a16="http://schemas.microsoft.com/office/drawing/2014/main" id="{EFA9F45C-5149-617B-10B6-A66FB472A8D4}"/>
+                  </a:ext>
+                </a:extLst>
+              </p:cNvPr>
+              <p:cNvPicPr/>
+              <p:nvPr/>
+            </p:nvPicPr>
+            <p:blipFill>
+              <a:blip r:embed="rId4"/>
+              <a:stretch>
+                <a:fillRect/>
+              </a:stretch>
+            </p:blipFill>
+            <p:spPr>
+              <a:xfrm>
+                <a:off x="5831640" y="3822840"/>
+                <a:ext cx="115560" cy="819720"/>
+              </a:xfrm>
+              <a:prstGeom prst="rect">
+                <a:avLst/>
+              </a:prstGeom>
+            </p:spPr>
+          </p:pic>
+        </mc:Fallback>
+      </mc:AlternateContent>
     </p:spTree>
   </p:cSld>
   <p:clrMapOvr>

</xml_diff>